<commit_message>
fatta slide presentazione aws e pg
</commit_message>
<xml_diff>
--- a/RTB/TECNOLOGIE/Tecnologie.pptx
+++ b/RTB/TECNOLOGIE/Tecnologie.pptx
@@ -4391,7 +4391,7 @@
       </dgm:t>
     </dgm:pt>
     <dgm:pt modelId="{FB7856FD-14F6-497F-A96F-439DE861ECA4}">
-      <dgm:prSet/>
+      <dgm:prSet custT="1"/>
       <dgm:spPr>
         <a:solidFill>
           <a:srgbClr val="FFFAEF">
@@ -4404,10 +4404,10 @@
         <a:lstStyle/>
         <a:p>
           <a:r>
-            <a:rPr lang="it-IT" b="1" dirty="0"/>
+            <a:rPr lang="it-IT" sz="1800" b="1" dirty="0"/>
             <a:t>Struttura dati relazionale</a:t>
           </a:r>
-          <a:endParaRPr lang="en-US" dirty="0"/>
+          <a:endParaRPr lang="en-US" sz="1800" dirty="0"/>
         </a:p>
       </dgm:t>
     </dgm:pt>
@@ -4434,7 +4434,7 @@
       </dgm:t>
     </dgm:pt>
     <dgm:pt modelId="{52FB12EC-3A86-437D-8162-C9740689D435}">
-      <dgm:prSet/>
+      <dgm:prSet custT="1"/>
       <dgm:spPr/>
       <dgm:t>
         <a:bodyPr/>
@@ -4442,11 +4442,11 @@
         <a:p>
           <a:pPr>
             <a:buFont typeface="Arial" panose="020B0604020202020204" pitchFamily="34" charset="0"/>
-            <a:buChar char="–"/>
+            <a:buChar char="•"/>
           </a:pPr>
           <a:r>
-            <a:rPr lang="it-IT"/>
-            <a:t>Company: aziende che utilizzano la piattaforma</a:t>
+            <a:rPr lang="it-IT" sz="1800" dirty="0"/>
+            <a:t>Gestisce la persistenza di tutti i dati: aziende, conversazioni, toni, rating.</a:t>
           </a:r>
         </a:p>
       </dgm:t>
@@ -4473,152 +4473,8 @@
         </a:p>
       </dgm:t>
     </dgm:pt>
-    <dgm:pt modelId="{408BA750-0FA9-43D6-9570-FC03D29B357C}">
-      <dgm:prSet/>
-      <dgm:spPr/>
-      <dgm:t>
-        <a:bodyPr/>
-        <a:lstStyle/>
-        <a:p>
-          <a:pPr>
-            <a:buFont typeface="Arial" panose="020B0604020202020204" pitchFamily="34" charset="0"/>
-            <a:buChar char="–"/>
-          </a:pPr>
-          <a:r>
-            <a:rPr lang="it-IT" dirty="0" err="1"/>
-            <a:t>Conversation</a:t>
-          </a:r>
-          <a:r>
-            <a:rPr lang="it-IT" dirty="0"/>
-            <a:t> + Message: storico conversazioni AI con contesto</a:t>
-          </a:r>
-        </a:p>
-      </dgm:t>
-    </dgm:pt>
-    <dgm:pt modelId="{F268AC99-4CE0-47BA-9E2A-585B5B0674FA}" type="parTrans" cxnId="{1DD30A87-2D39-4C6A-B397-FBDBFECE6FE7}">
-      <dgm:prSet/>
-      <dgm:spPr/>
-      <dgm:t>
-        <a:bodyPr/>
-        <a:lstStyle/>
-        <a:p>
-          <a:endParaRPr lang="it-IT"/>
-        </a:p>
-      </dgm:t>
-    </dgm:pt>
-    <dgm:pt modelId="{9A3E9596-29FE-48AA-810B-729B79CA1295}" type="sibTrans" cxnId="{1DD30A87-2D39-4C6A-B397-FBDBFECE6FE7}">
-      <dgm:prSet/>
-      <dgm:spPr/>
-      <dgm:t>
-        <a:bodyPr/>
-        <a:lstStyle/>
-        <a:p>
-          <a:endParaRPr lang="it-IT"/>
-        </a:p>
-      </dgm:t>
-    </dgm:pt>
-    <dgm:pt modelId="{5FDB182A-1DEE-44D7-BFED-BBF945EE62CB}">
-      <dgm:prSet/>
-      <dgm:spPr/>
-      <dgm:t>
-        <a:bodyPr/>
-        <a:lstStyle/>
-        <a:p>
-          <a:pPr>
-            <a:buFont typeface="Arial" panose="020B0604020202020204" pitchFamily="34" charset="0"/>
-            <a:buChar char="–"/>
-          </a:pPr>
-          <a:r>
-            <a:rPr lang="it-IT"/>
-            <a:t>Tone: toni comunicativi personalizzati per azienda</a:t>
-          </a:r>
-        </a:p>
-      </dgm:t>
-    </dgm:pt>
-    <dgm:pt modelId="{153A0FBC-C140-4356-8583-2D0BF651200B}" type="parTrans" cxnId="{6BF2D5D0-E18E-4BCB-B6D0-F34ACE3C880C}">
-      <dgm:prSet/>
-      <dgm:spPr/>
-      <dgm:t>
-        <a:bodyPr/>
-        <a:lstStyle/>
-        <a:p>
-          <a:endParaRPr lang="it-IT"/>
-        </a:p>
-      </dgm:t>
-    </dgm:pt>
-    <dgm:pt modelId="{BBA2B99B-BDFA-4A8E-8555-F07CD7C8A06B}" type="sibTrans" cxnId="{6BF2D5D0-E18E-4BCB-B6D0-F34ACE3C880C}">
-      <dgm:prSet/>
-      <dgm:spPr/>
-      <dgm:t>
-        <a:bodyPr/>
-        <a:lstStyle/>
-        <a:p>
-          <a:endParaRPr lang="it-IT"/>
-        </a:p>
-      </dgm:t>
-    </dgm:pt>
-    <dgm:pt modelId="{2002B1BF-C305-46F1-9A72-54F7C946E189}">
-      <dgm:prSet/>
-      <dgm:spPr/>
-      <dgm:t>
-        <a:bodyPr/>
-        <a:lstStyle/>
-        <a:p>
-          <a:pPr>
-            <a:buFont typeface="Arial" panose="020B0604020202020204" pitchFamily="34" charset="0"/>
-            <a:buChar char="–"/>
-          </a:pPr>
-          <a:r>
-            <a:rPr lang="it-IT" dirty="0" err="1"/>
-            <a:t>Document</a:t>
-          </a:r>
-          <a:r>
-            <a:rPr lang="it-IT" dirty="0"/>
-            <a:t>: metadati documenti con status (</a:t>
-          </a:r>
-          <a:r>
-            <a:rPr lang="it-IT" dirty="0" err="1"/>
-            <a:t>pending</a:t>
-          </a:r>
-          <a:r>
-            <a:rPr lang="it-IT" dirty="0"/>
-            <a:t>/processing/</a:t>
-          </a:r>
-          <a:r>
-            <a:rPr lang="it-IT" dirty="0" err="1"/>
-            <a:t>completed</a:t>
-          </a:r>
-          <a:r>
-            <a:rPr lang="it-IT" dirty="0"/>
-            <a:t>)</a:t>
-          </a:r>
-        </a:p>
-      </dgm:t>
-    </dgm:pt>
-    <dgm:pt modelId="{A07200E9-F459-4499-9625-95D6F1E16479}" type="parTrans" cxnId="{24BAC226-2B67-4D2C-AF64-512D2E4C11FC}">
-      <dgm:prSet/>
-      <dgm:spPr/>
-      <dgm:t>
-        <a:bodyPr/>
-        <a:lstStyle/>
-        <a:p>
-          <a:endParaRPr lang="it-IT"/>
-        </a:p>
-      </dgm:t>
-    </dgm:pt>
-    <dgm:pt modelId="{2264891B-C779-4212-854F-6CF8129FC93B}" type="sibTrans" cxnId="{24BAC226-2B67-4D2C-AF64-512D2E4C11FC}">
-      <dgm:prSet/>
-      <dgm:spPr/>
-      <dgm:t>
-        <a:bodyPr/>
-        <a:lstStyle/>
-        <a:p>
-          <a:endParaRPr lang="it-IT"/>
-        </a:p>
-      </dgm:t>
-    </dgm:pt>
     <dgm:pt modelId="{75760154-6F25-4950-89B9-9CF9FC7549C3}">
-      <dgm:prSet/>
+      <dgm:prSet custT="1"/>
       <dgm:spPr/>
       <dgm:t>
         <a:bodyPr/>
@@ -4629,9 +4485,14 @@
             <a:buChar char="•"/>
           </a:pPr>
           <a:r>
-            <a:rPr lang="it-IT" b="1" dirty="0"/>
-            <a:t>Active Record ORM</a:t>
+            <a:rPr lang="it-IT" sz="1800" b="1" dirty="0"/>
+            <a:t>Integrazione con </a:t>
           </a:r>
+          <a:r>
+            <a:rPr lang="it-IT" sz="1800" b="1" dirty="0" err="1"/>
+            <a:t>Rails</a:t>
+          </a:r>
+          <a:endParaRPr lang="it-IT" sz="1800" b="1" dirty="0"/>
         </a:p>
       </dgm:t>
     </dgm:pt>
@@ -4657,151 +4518,8 @@
         </a:p>
       </dgm:t>
     </dgm:pt>
-    <dgm:pt modelId="{5045A031-9788-493D-B27E-67F1986B68B7}">
-      <dgm:prSet/>
-      <dgm:spPr/>
-      <dgm:t>
-        <a:bodyPr/>
-        <a:lstStyle/>
-        <a:p>
-          <a:pPr>
-            <a:buFont typeface="Arial" panose="020B0604020202020204" pitchFamily="34" charset="0"/>
-            <a:buChar char="–"/>
-          </a:pPr>
-          <a:r>
-            <a:rPr lang="en-US"/>
-            <a:t>Relazioni: Company has_many Documents, Conversations, Tones</a:t>
-          </a:r>
-          <a:endParaRPr lang="it-IT"/>
-        </a:p>
-      </dgm:t>
-    </dgm:pt>
-    <dgm:pt modelId="{532C06C4-FE9B-4EAC-B031-20C229257888}" type="parTrans" cxnId="{1FB8C610-6432-4AF1-8C99-B5A34E7E6A85}">
-      <dgm:prSet/>
-      <dgm:spPr/>
-      <dgm:t>
-        <a:bodyPr/>
-        <a:lstStyle/>
-        <a:p>
-          <a:endParaRPr lang="it-IT"/>
-        </a:p>
-      </dgm:t>
-    </dgm:pt>
-    <dgm:pt modelId="{F6E2A9B9-B621-4170-AC4B-AB4079A318BF}" type="sibTrans" cxnId="{1FB8C610-6432-4AF1-8C99-B5A34E7E6A85}">
-      <dgm:prSet/>
-      <dgm:spPr/>
-      <dgm:t>
-        <a:bodyPr/>
-        <a:lstStyle/>
-        <a:p>
-          <a:endParaRPr lang="it-IT"/>
-        </a:p>
-      </dgm:t>
-    </dgm:pt>
-    <dgm:pt modelId="{5C5C5E19-B2D2-468A-A936-7BF37E9F8C73}">
-      <dgm:prSet/>
-      <dgm:spPr/>
-      <dgm:t>
-        <a:bodyPr/>
-        <a:lstStyle/>
-        <a:p>
-          <a:pPr>
-            <a:buFont typeface="Arial" panose="020B0604020202020204" pitchFamily="34" charset="0"/>
-            <a:buChar char="–"/>
-          </a:pPr>
-          <a:r>
-            <a:rPr lang="en-US"/>
-            <a:t>Validazioni, enum per status, callbacks lifecycle</a:t>
-          </a:r>
-          <a:endParaRPr lang="it-IT"/>
-        </a:p>
-      </dgm:t>
-    </dgm:pt>
-    <dgm:pt modelId="{0B004B41-3091-4786-9AE7-32ACED007C14}" type="parTrans" cxnId="{EB7EBDDE-F976-4F14-9E0A-3B6356EDFD93}">
-      <dgm:prSet/>
-      <dgm:spPr/>
-      <dgm:t>
-        <a:bodyPr/>
-        <a:lstStyle/>
-        <a:p>
-          <a:endParaRPr lang="it-IT"/>
-        </a:p>
-      </dgm:t>
-    </dgm:pt>
-    <dgm:pt modelId="{8CC2B502-BCB2-4D1C-AD2F-EFB1F4362593}" type="sibTrans" cxnId="{EB7EBDDE-F976-4F14-9E0A-3B6356EDFD93}">
-      <dgm:prSet/>
-      <dgm:spPr/>
-      <dgm:t>
-        <a:bodyPr/>
-        <a:lstStyle/>
-        <a:p>
-          <a:endParaRPr lang="it-IT"/>
-        </a:p>
-      </dgm:t>
-    </dgm:pt>
-    <dgm:pt modelId="{DBCB3B09-439F-4866-90C4-B949EECCBE4E}">
-      <dgm:prSet/>
-      <dgm:spPr/>
-      <dgm:t>
-        <a:bodyPr/>
-        <a:lstStyle/>
-        <a:p>
-          <a:pPr>
-            <a:buFont typeface="Arial" panose="020B0604020202020204" pitchFamily="34" charset="0"/>
-            <a:buChar char="–"/>
-          </a:pPr>
-          <a:r>
-            <a:rPr lang="it-IT" dirty="0"/>
-            <a:t>JSON </a:t>
-          </a:r>
-          <a:r>
-            <a:rPr lang="it-IT" dirty="0" err="1"/>
-            <a:t>column</a:t>
-          </a:r>
-          <a:r>
-            <a:rPr lang="it-IT" dirty="0"/>
-            <a:t> (</a:t>
-          </a:r>
-          <a:r>
-            <a:rPr lang="it-IT" dirty="0" err="1"/>
-            <a:t>ai_data</a:t>
-          </a:r>
-          <a:r>
-            <a:rPr lang="it-IT" dirty="0"/>
-            <a:t>) per salvare dati estratti da </a:t>
-          </a:r>
-          <a:r>
-            <a:rPr lang="it-IT" dirty="0" err="1"/>
-            <a:t>Bedrock</a:t>
-          </a:r>
-          <a:endParaRPr lang="it-IT" dirty="0"/>
-        </a:p>
-      </dgm:t>
-    </dgm:pt>
-    <dgm:pt modelId="{80A1B53E-2029-490F-B4C5-72C474F8A936}" type="parTrans" cxnId="{DAEA42DE-A81C-41B3-B45C-E0F7E86C2608}">
-      <dgm:prSet/>
-      <dgm:spPr/>
-      <dgm:t>
-        <a:bodyPr/>
-        <a:lstStyle/>
-        <a:p>
-          <a:endParaRPr lang="it-IT"/>
-        </a:p>
-      </dgm:t>
-    </dgm:pt>
-    <dgm:pt modelId="{F8014117-ADF5-4381-A03D-00DBD689B22A}" type="sibTrans" cxnId="{DAEA42DE-A81C-41B3-B45C-E0F7E86C2608}">
-      <dgm:prSet/>
-      <dgm:spPr/>
-      <dgm:t>
-        <a:bodyPr/>
-        <a:lstStyle/>
-        <a:p>
-          <a:endParaRPr lang="it-IT"/>
-        </a:p>
-      </dgm:t>
-    </dgm:pt>
     <dgm:pt modelId="{F8EFD2C1-0F92-46D0-B280-438E38B47423}">
-      <dgm:prSet/>
+      <dgm:prSet custT="1"/>
       <dgm:spPr/>
       <dgm:t>
         <a:bodyPr/>
@@ -4811,7 +4529,7 @@
             <a:buFont typeface="Arial" panose="020B0604020202020204" pitchFamily="34" charset="0"/>
             <a:buNone/>
           </a:pPr>
-          <a:endParaRPr lang="it-IT" dirty="0"/>
+          <a:endParaRPr lang="it-IT" sz="1800" dirty="0"/>
         </a:p>
       </dgm:t>
     </dgm:pt>
@@ -4827,6 +4545,110 @@
       </dgm:t>
     </dgm:pt>
     <dgm:pt modelId="{828438A2-5FC5-45E6-8C87-93FAB1B87F42}" type="sibTrans" cxnId="{9E962512-2E4C-4C3D-BC6E-D709F63F11D8}">
+      <dgm:prSet/>
+      <dgm:spPr/>
+      <dgm:t>
+        <a:bodyPr/>
+        <a:lstStyle/>
+        <a:p>
+          <a:endParaRPr lang="it-IT"/>
+        </a:p>
+      </dgm:t>
+    </dgm:pt>
+    <dgm:pt modelId="{1AE158BC-123A-4312-87AB-611654757C71}">
+      <dgm:prSet custT="1"/>
+      <dgm:spPr/>
+      <dgm:t>
+        <a:bodyPr/>
+        <a:lstStyle/>
+        <a:p>
+          <a:pPr>
+            <a:buFont typeface="Arial" panose="020B0604020202020204" pitchFamily="34" charset="0"/>
+            <a:buChar char="•"/>
+          </a:pPr>
+          <a:r>
+            <a:rPr lang="it-IT" sz="1800" b="0" dirty="0"/>
+            <a:t>Supporto nativo e totale, gestito tramite </a:t>
+          </a:r>
+          <a:r>
+            <a:rPr lang="it-IT" sz="1800" b="0" dirty="0" err="1"/>
+            <a:t>active</a:t>
+          </a:r>
+          <a:r>
+            <a:rPr lang="it-IT" sz="1800" b="0" dirty="0"/>
+            <a:t> record.</a:t>
+          </a:r>
+        </a:p>
+      </dgm:t>
+    </dgm:pt>
+    <dgm:pt modelId="{AE444D96-6588-4AB3-8CAE-05097BB3415A}" type="parTrans" cxnId="{A887CF38-3160-4758-B56F-E017C00FCD3B}">
+      <dgm:prSet/>
+      <dgm:spPr/>
+      <dgm:t>
+        <a:bodyPr/>
+        <a:lstStyle/>
+        <a:p>
+          <a:endParaRPr lang="it-IT"/>
+        </a:p>
+      </dgm:t>
+    </dgm:pt>
+    <dgm:pt modelId="{55296194-9071-4D1E-8E3A-EC674202C296}" type="sibTrans" cxnId="{A887CF38-3160-4758-B56F-E017C00FCD3B}">
+      <dgm:prSet/>
+      <dgm:spPr/>
+      <dgm:t>
+        <a:bodyPr/>
+        <a:lstStyle/>
+        <a:p>
+          <a:endParaRPr lang="it-IT"/>
+        </a:p>
+      </dgm:t>
+    </dgm:pt>
+    <dgm:pt modelId="{05F0E1CD-2C30-4158-B551-6C2571197B38}">
+      <dgm:prSet custT="1"/>
+      <dgm:spPr/>
+      <dgm:t>
+        <a:bodyPr/>
+        <a:lstStyle/>
+        <a:p>
+          <a:pPr>
+            <a:buFont typeface="Arial" panose="020B0604020202020204" pitchFamily="34" charset="0"/>
+            <a:buChar char="•"/>
+          </a:pPr>
+          <a:r>
+            <a:rPr lang="it-IT" sz="1800" b="0" dirty="0"/>
+            <a:t>Separazione ambienti: test, </a:t>
+          </a:r>
+          <a:r>
+            <a:rPr lang="it-IT" sz="1800" b="0" dirty="0" err="1"/>
+            <a:t>dev</a:t>
+          </a:r>
+          <a:r>
+            <a:rPr lang="it-IT" sz="1800" b="0" dirty="0"/>
+            <a:t> e </a:t>
+          </a:r>
+          <a:r>
+            <a:rPr lang="it-IT" sz="1800" b="0" dirty="0" err="1"/>
+            <a:t>prod</a:t>
+          </a:r>
+          <a:r>
+            <a:rPr lang="it-IT" sz="1800" b="0" dirty="0"/>
+            <a:t>.</a:t>
+          </a:r>
+        </a:p>
+      </dgm:t>
+    </dgm:pt>
+    <dgm:pt modelId="{8D1ABA1F-77EA-48EA-90FE-3A76B743B60A}" type="parTrans" cxnId="{E28D0E2B-FCBF-4AC0-A170-E0A94A2A6BEA}">
+      <dgm:prSet/>
+      <dgm:spPr/>
+      <dgm:t>
+        <a:bodyPr/>
+        <a:lstStyle/>
+        <a:p>
+          <a:endParaRPr lang="it-IT"/>
+        </a:p>
+      </dgm:t>
+    </dgm:pt>
+    <dgm:pt modelId="{D578950F-F40C-4A12-AC4A-55F7CECE6C12}" type="sibTrans" cxnId="{E28D0E2B-FCBF-4AC0-A170-E0A94A2A6BEA}">
       <dgm:prSet/>
       <dgm:spPr/>
       <dgm:t>
@@ -4878,35 +4700,27 @@
     </dgm:pt>
   </dgm:ptLst>
   <dgm:cxnLst>
-    <dgm:cxn modelId="{1FB8C610-6432-4AF1-8C99-B5A34E7E6A85}" srcId="{75760154-6F25-4950-89B9-9CF9FC7549C3}" destId="{5045A031-9788-493D-B27E-67F1986B68B7}" srcOrd="0" destOrd="0" parTransId="{532C06C4-FE9B-4EAC-B031-20C229257888}" sibTransId="{F6E2A9B9-B621-4170-AC4B-AB4079A318BF}"/>
-    <dgm:cxn modelId="{CFEBE311-F2F4-48AE-8755-C2D0422F7F96}" type="presOf" srcId="{52FB12EC-3A86-437D-8162-C9740689D435}" destId="{8A748C3E-CE62-4E92-A0FE-1F5548AC9D02}" srcOrd="0" destOrd="1" presId="urn:microsoft.com/office/officeart/2005/8/layout/list1"/>
     <dgm:cxn modelId="{9E962512-2E4C-4C3D-BC6E-D709F63F11D8}" srcId="{EE76E364-6A46-492A-9FD7-63C775ADA808}" destId="{F8EFD2C1-0F92-46D0-B280-438E38B47423}" srcOrd="1" destOrd="0" parTransId="{FDB31F6A-AD14-4850-BBFD-61B0AB66B8D0}" sibTransId="{828438A2-5FC5-45E6-8C87-93FAB1B87F42}"/>
-    <dgm:cxn modelId="{24BAC226-2B67-4D2C-AF64-512D2E4C11FC}" srcId="{FB7856FD-14F6-497F-A96F-439DE861ECA4}" destId="{2002B1BF-C305-46F1-9A72-54F7C946E189}" srcOrd="3" destOrd="0" parTransId="{A07200E9-F459-4499-9625-95D6F1E16479}" sibTransId="{2264891B-C779-4212-854F-6CF8129FC93B}"/>
-    <dgm:cxn modelId="{DBE0AE33-2290-4E80-9BC8-8A42CD542C2A}" type="presOf" srcId="{408BA750-0FA9-43D6-9570-FC03D29B357C}" destId="{8A748C3E-CE62-4E92-A0FE-1F5548AC9D02}" srcOrd="0" destOrd="2" presId="urn:microsoft.com/office/officeart/2005/8/layout/list1"/>
+    <dgm:cxn modelId="{E28D0E2B-FCBF-4AC0-A170-E0A94A2A6BEA}" srcId="{75760154-6F25-4950-89B9-9CF9FC7549C3}" destId="{05F0E1CD-2C30-4158-B551-6C2571197B38}" srcOrd="1" destOrd="0" parTransId="{8D1ABA1F-77EA-48EA-90FE-3A76B743B60A}" sibTransId="{D578950F-F40C-4A12-AC4A-55F7CECE6C12}"/>
+    <dgm:cxn modelId="{0D796F36-EB6F-444C-B549-2A52D132F446}" type="presOf" srcId="{75760154-6F25-4950-89B9-9CF9FC7549C3}" destId="{8A748C3E-CE62-4E92-A0FE-1F5548AC9D02}" srcOrd="0" destOrd="3" presId="urn:microsoft.com/office/officeart/2005/8/layout/list1"/>
+    <dgm:cxn modelId="{A887CF38-3160-4758-B56F-E017C00FCD3B}" srcId="{75760154-6F25-4950-89B9-9CF9FC7549C3}" destId="{1AE158BC-123A-4312-87AB-611654757C71}" srcOrd="0" destOrd="0" parTransId="{AE444D96-6588-4AB3-8CAE-05097BB3415A}" sibTransId="{55296194-9071-4D1E-8E3A-EC674202C296}"/>
     <dgm:cxn modelId="{0C848A3D-3553-4924-8D80-54F69669587F}" type="presOf" srcId="{228ADC0D-83DA-40CE-9EF2-B2A23B2BA12F}" destId="{529C8736-509C-426A-B1AF-D9FE39FB5B28}" srcOrd="0" destOrd="0" presId="urn:microsoft.com/office/officeart/2005/8/layout/list1"/>
-    <dgm:cxn modelId="{8A89695B-86B2-4592-B9C9-6143CA1338E3}" type="presOf" srcId="{5FDB182A-1DEE-44D7-BFED-BBF945EE62CB}" destId="{8A748C3E-CE62-4E92-A0FE-1F5548AC9D02}" srcOrd="0" destOrd="3" presId="urn:microsoft.com/office/officeart/2005/8/layout/list1"/>
-    <dgm:cxn modelId="{EEDAF446-C98D-48BA-A5AC-0923FEB5A3F9}" type="presOf" srcId="{5045A031-9788-493D-B27E-67F1986B68B7}" destId="{8A748C3E-CE62-4E92-A0FE-1F5548AC9D02}" srcOrd="0" destOrd="7" presId="urn:microsoft.com/office/officeart/2005/8/layout/list1"/>
-    <dgm:cxn modelId="{0BC9C054-3597-4B1B-BFC2-AB844C29AAC9}" type="presOf" srcId="{F8EFD2C1-0F92-46D0-B280-438E38B47423}" destId="{8A748C3E-CE62-4E92-A0FE-1F5548AC9D02}" srcOrd="0" destOrd="5" presId="urn:microsoft.com/office/officeart/2005/8/layout/list1"/>
+    <dgm:cxn modelId="{E86BFB77-E54B-4335-99EA-45D4F33F889A}" type="presOf" srcId="{52FB12EC-3A86-437D-8162-C9740689D435}" destId="{8A748C3E-CE62-4E92-A0FE-1F5548AC9D02}" srcOrd="0" destOrd="1" presId="urn:microsoft.com/office/officeart/2005/8/layout/list1"/>
     <dgm:cxn modelId="{F609747B-AE71-4ACA-93A0-5C6C9FA2C6E1}" srcId="{EE76E364-6A46-492A-9FD7-63C775ADA808}" destId="{FB7856FD-14F6-497F-A96F-439DE861ECA4}" srcOrd="0" destOrd="0" parTransId="{B2A71A46-24A2-44C1-B6DD-257439AFBC0A}" sibTransId="{AED585D0-E158-48D1-8037-5DB08D2C892B}"/>
-    <dgm:cxn modelId="{1DD30A87-2D39-4C6A-B397-FBDBFECE6FE7}" srcId="{FB7856FD-14F6-497F-A96F-439DE861ECA4}" destId="{408BA750-0FA9-43D6-9570-FC03D29B357C}" srcOrd="1" destOrd="0" parTransId="{F268AC99-4CE0-47BA-9E2A-585B5B0674FA}" sibTransId="{9A3E9596-29FE-48AA-810B-729B79CA1295}"/>
-    <dgm:cxn modelId="{1F326F96-74B2-4E35-AD0B-367E588DABA4}" type="presOf" srcId="{5C5C5E19-B2D2-468A-A936-7BF37E9F8C73}" destId="{8A748C3E-CE62-4E92-A0FE-1F5548AC9D02}" srcOrd="0" destOrd="8" presId="urn:microsoft.com/office/officeart/2005/8/layout/list1"/>
-    <dgm:cxn modelId="{57E6E7A2-8B84-40E9-A2BC-9F929492C7AC}" type="presOf" srcId="{75760154-6F25-4950-89B9-9CF9FC7549C3}" destId="{8A748C3E-CE62-4E92-A0FE-1F5548AC9D02}" srcOrd="0" destOrd="6" presId="urn:microsoft.com/office/officeart/2005/8/layout/list1"/>
-    <dgm:cxn modelId="{E47CEAC2-60B6-4369-8E67-C27CD02C2B87}" type="presOf" srcId="{2002B1BF-C305-46F1-9A72-54F7C946E189}" destId="{8A748C3E-CE62-4E92-A0FE-1F5548AC9D02}" srcOrd="0" destOrd="4" presId="urn:microsoft.com/office/officeart/2005/8/layout/list1"/>
-    <dgm:cxn modelId="{6BF2D5D0-E18E-4BCB-B6D0-F34ACE3C880C}" srcId="{FB7856FD-14F6-497F-A96F-439DE861ECA4}" destId="{5FDB182A-1DEE-44D7-BFED-BBF945EE62CB}" srcOrd="2" destOrd="0" parTransId="{153A0FBC-C140-4356-8583-2D0BF651200B}" sibTransId="{BBA2B99B-BDFA-4A8E-8555-F07CD7C8A06B}"/>
-    <dgm:cxn modelId="{DAEA42DE-A81C-41B3-B45C-E0F7E86C2608}" srcId="{75760154-6F25-4950-89B9-9CF9FC7549C3}" destId="{DBCB3B09-439F-4866-90C4-B949EECCBE4E}" srcOrd="2" destOrd="0" parTransId="{80A1B53E-2029-490F-B4C5-72C474F8A936}" sibTransId="{F8014117-ADF5-4381-A03D-00DBD689B22A}"/>
-    <dgm:cxn modelId="{EB7EBDDE-F976-4F14-9E0A-3B6356EDFD93}" srcId="{75760154-6F25-4950-89B9-9CF9FC7549C3}" destId="{5C5C5E19-B2D2-468A-A936-7BF37E9F8C73}" srcOrd="1" destOrd="0" parTransId="{0B004B41-3091-4786-9AE7-32ACED007C14}" sibTransId="{8CC2B502-BCB2-4D1C-AD2F-EFB1F4362593}"/>
+    <dgm:cxn modelId="{26ACEFB1-DD3B-4E6D-853D-97022B2F3A3C}" type="presOf" srcId="{EE76E364-6A46-492A-9FD7-63C775ADA808}" destId="{EF67F11A-FCD0-4E59-A23F-17BCC3FB1182}" srcOrd="1" destOrd="0" presId="urn:microsoft.com/office/officeart/2005/8/layout/list1"/>
+    <dgm:cxn modelId="{2BFBFCCD-3313-4310-BA02-BCD93756A5C0}" type="presOf" srcId="{05F0E1CD-2C30-4158-B551-6C2571197B38}" destId="{8A748C3E-CE62-4E92-A0FE-1F5548AC9D02}" srcOrd="0" destOrd="5" presId="urn:microsoft.com/office/officeart/2005/8/layout/list1"/>
+    <dgm:cxn modelId="{736627DC-1951-4251-B41E-B0401AA3C2FF}" type="presOf" srcId="{EE76E364-6A46-492A-9FD7-63C775ADA808}" destId="{0E75AC4A-956D-493C-A82B-572CF3B1603B}" srcOrd="0" destOrd="0" presId="urn:microsoft.com/office/officeart/2005/8/layout/list1"/>
     <dgm:cxn modelId="{8ADAB9E6-BB3B-4581-9B45-07948A4AEA67}" srcId="{228ADC0D-83DA-40CE-9EF2-B2A23B2BA12F}" destId="{EE76E364-6A46-492A-9FD7-63C775ADA808}" srcOrd="0" destOrd="0" parTransId="{522B9AE2-1358-4DCB-B21B-51AD7A4CC3B6}" sibTransId="{119AEC78-9891-4081-85AD-AAE5114E48ED}"/>
-    <dgm:cxn modelId="{5F8F92EB-50B5-44AD-B1FF-47D707FDF7B2}" type="presOf" srcId="{FB7856FD-14F6-497F-A96F-439DE861ECA4}" destId="{8A748C3E-CE62-4E92-A0FE-1F5548AC9D02}" srcOrd="0" destOrd="0" presId="urn:microsoft.com/office/officeart/2005/8/layout/list1"/>
-    <dgm:cxn modelId="{904D3CEE-C5A1-4473-8793-0292B67E613D}" type="presOf" srcId="{DBCB3B09-439F-4866-90C4-B949EECCBE4E}" destId="{8A748C3E-CE62-4E92-A0FE-1F5548AC9D02}" srcOrd="0" destOrd="9" presId="urn:microsoft.com/office/officeart/2005/8/layout/list1"/>
+    <dgm:cxn modelId="{C44669EC-49C6-4605-A535-20866562287D}" type="presOf" srcId="{FB7856FD-14F6-497F-A96F-439DE861ECA4}" destId="{8A748C3E-CE62-4E92-A0FE-1F5548AC9D02}" srcOrd="0" destOrd="0" presId="urn:microsoft.com/office/officeart/2005/8/layout/list1"/>
+    <dgm:cxn modelId="{9F618FF5-37CA-4B38-8CBD-180A61922656}" type="presOf" srcId="{1AE158BC-123A-4312-87AB-611654757C71}" destId="{8A748C3E-CE62-4E92-A0FE-1F5548AC9D02}" srcOrd="0" destOrd="4" presId="urn:microsoft.com/office/officeart/2005/8/layout/list1"/>
     <dgm:cxn modelId="{7F177BF6-277F-4E29-8254-C721FD18EC32}" srcId="{EE76E364-6A46-492A-9FD7-63C775ADA808}" destId="{75760154-6F25-4950-89B9-9CF9FC7549C3}" srcOrd="2" destOrd="0" parTransId="{7ABD45F0-A301-491F-BECA-4B86819DD71B}" sibTransId="{FFEDCB0D-CF46-46A4-A1C5-D3F854D9C041}"/>
-    <dgm:cxn modelId="{6C348AF7-C2E8-4FA3-9C14-67012269D77B}" type="presOf" srcId="{EE76E364-6A46-492A-9FD7-63C775ADA808}" destId="{EF67F11A-FCD0-4E59-A23F-17BCC3FB1182}" srcOrd="1" destOrd="0" presId="urn:microsoft.com/office/officeart/2005/8/layout/list1"/>
-    <dgm:cxn modelId="{788CE9F8-7388-45A5-8222-B04CD3855CFC}" type="presOf" srcId="{EE76E364-6A46-492A-9FD7-63C775ADA808}" destId="{0E75AC4A-956D-493C-A82B-572CF3B1603B}" srcOrd="0" destOrd="0" presId="urn:microsoft.com/office/officeart/2005/8/layout/list1"/>
+    <dgm:cxn modelId="{74C355F8-2D89-4645-9118-35009AE4CF1E}" type="presOf" srcId="{F8EFD2C1-0F92-46D0-B280-438E38B47423}" destId="{8A748C3E-CE62-4E92-A0FE-1F5548AC9D02}" srcOrd="0" destOrd="2" presId="urn:microsoft.com/office/officeart/2005/8/layout/list1"/>
     <dgm:cxn modelId="{92D0BEFC-E69B-41C3-BB41-D65E08A15A26}" srcId="{FB7856FD-14F6-497F-A96F-439DE861ECA4}" destId="{52FB12EC-3A86-437D-8162-C9740689D435}" srcOrd="0" destOrd="0" parTransId="{71559100-3D32-4A98-B55D-425BAB0E8645}" sibTransId="{A73FFB8C-3675-451A-980A-D2CD36689E30}"/>
-    <dgm:cxn modelId="{CB6F8F2B-A478-4BA2-A44A-534C24A7F190}" type="presParOf" srcId="{529C8736-509C-426A-B1AF-D9FE39FB5B28}" destId="{8BC7EA25-256B-410A-8E19-CC15A19D412A}" srcOrd="0" destOrd="0" presId="urn:microsoft.com/office/officeart/2005/8/layout/list1"/>
-    <dgm:cxn modelId="{BE58CEBB-4F1B-4A04-94DE-6B7B71E004F0}" type="presParOf" srcId="{8BC7EA25-256B-410A-8E19-CC15A19D412A}" destId="{0E75AC4A-956D-493C-A82B-572CF3B1603B}" srcOrd="0" destOrd="0" presId="urn:microsoft.com/office/officeart/2005/8/layout/list1"/>
-    <dgm:cxn modelId="{BB2B70D8-6937-462B-BC87-D942C36A8F52}" type="presParOf" srcId="{8BC7EA25-256B-410A-8E19-CC15A19D412A}" destId="{EF67F11A-FCD0-4E59-A23F-17BCC3FB1182}" srcOrd="1" destOrd="0" presId="urn:microsoft.com/office/officeart/2005/8/layout/list1"/>
-    <dgm:cxn modelId="{0276A569-F1D8-4B2A-9825-33EB0A54231B}" type="presParOf" srcId="{529C8736-509C-426A-B1AF-D9FE39FB5B28}" destId="{E84E3A97-5D14-4C15-B06F-E00215B154CE}" srcOrd="1" destOrd="0" presId="urn:microsoft.com/office/officeart/2005/8/layout/list1"/>
-    <dgm:cxn modelId="{3027F928-B6B9-4AAC-9558-9471D0B98958}" type="presParOf" srcId="{529C8736-509C-426A-B1AF-D9FE39FB5B28}" destId="{8A748C3E-CE62-4E92-A0FE-1F5548AC9D02}" srcOrd="2" destOrd="0" presId="urn:microsoft.com/office/officeart/2005/8/layout/list1"/>
+    <dgm:cxn modelId="{D31F86E7-04FF-4F8B-AC99-A0D5F643ED99}" type="presParOf" srcId="{529C8736-509C-426A-B1AF-D9FE39FB5B28}" destId="{8BC7EA25-256B-410A-8E19-CC15A19D412A}" srcOrd="0" destOrd="0" presId="urn:microsoft.com/office/officeart/2005/8/layout/list1"/>
+    <dgm:cxn modelId="{19883E83-E56D-436F-BE1B-CAEBD2E638AC}" type="presParOf" srcId="{8BC7EA25-256B-410A-8E19-CC15A19D412A}" destId="{0E75AC4A-956D-493C-A82B-572CF3B1603B}" srcOrd="0" destOrd="0" presId="urn:microsoft.com/office/officeart/2005/8/layout/list1"/>
+    <dgm:cxn modelId="{C65B2AAD-E9FC-4B25-9648-437559DEF8B1}" type="presParOf" srcId="{8BC7EA25-256B-410A-8E19-CC15A19D412A}" destId="{EF67F11A-FCD0-4E59-A23F-17BCC3FB1182}" srcOrd="1" destOrd="0" presId="urn:microsoft.com/office/officeart/2005/8/layout/list1"/>
+    <dgm:cxn modelId="{D13CD74D-3809-4C9F-A718-81BB55DC0ABA}" type="presParOf" srcId="{529C8736-509C-426A-B1AF-D9FE39FB5B28}" destId="{E84E3A97-5D14-4C15-B06F-E00215B154CE}" srcOrd="1" destOrd="0" presId="urn:microsoft.com/office/officeart/2005/8/layout/list1"/>
+    <dgm:cxn modelId="{F7C765B3-4E71-4A62-B284-36F513AC8E33}" type="presParOf" srcId="{529C8736-509C-426A-B1AF-D9FE39FB5B28}" destId="{8A748C3E-CE62-4E92-A0FE-1F5548AC9D02}" srcOrd="2" destOrd="0" presId="urn:microsoft.com/office/officeart/2005/8/layout/list1"/>
   </dgm:cxnLst>
   <dgm:bg/>
   <dgm:whole/>
@@ -4933,21 +4747,21 @@
       </dgm:t>
     </dgm:pt>
     <dgm:pt modelId="{EE76E364-6A46-492A-9FD7-63C775ADA808}">
-      <dgm:prSet/>
+      <dgm:prSet custT="1"/>
       <dgm:spPr/>
       <dgm:t>
         <a:bodyPr/>
         <a:lstStyle/>
         <a:p>
           <a:r>
-            <a:rPr lang="it-IT" b="1" dirty="0"/>
+            <a:rPr lang="it-IT" sz="2800" b="1" dirty="0"/>
             <a:t>AWS </a:t>
           </a:r>
           <a:r>
-            <a:rPr lang="it-IT" b="1" dirty="0" err="1"/>
+            <a:rPr lang="it-IT" sz="2800" b="1" dirty="0" err="1"/>
             <a:t>Bedrock</a:t>
           </a:r>
-          <a:endParaRPr lang="en-US" dirty="0"/>
+          <a:endParaRPr lang="en-US" sz="2800" dirty="0"/>
         </a:p>
       </dgm:t>
     </dgm:pt>
@@ -4974,7 +4788,7 @@
       </dgm:t>
     </dgm:pt>
     <dgm:pt modelId="{FB7856FD-14F6-497F-A96F-439DE861ECA4}">
-      <dgm:prSet/>
+      <dgm:prSet custT="1"/>
       <dgm:spPr>
         <a:solidFill>
           <a:srgbClr val="FFFAEF">
@@ -4987,10 +4801,10 @@
         <a:lstStyle/>
         <a:p>
           <a:r>
-            <a:rPr lang="it-IT" dirty="0"/>
-            <a:t>Modello Amazon Nova Lite v1 per generazione testo e OCR</a:t>
+            <a:rPr lang="it-IT" sz="1800" dirty="0"/>
+            <a:t>Modello Amazon Nova Lite v1 per generazione testo e Nova Canvas per generazioni immagini.</a:t>
           </a:r>
-          <a:endParaRPr lang="en-US" dirty="0"/>
+          <a:endParaRPr lang="en-US" sz="1800" dirty="0"/>
         </a:p>
       </dgm:t>
     </dgm:pt>
@@ -5016,50 +4830,8 @@
         </a:p>
       </dgm:t>
     </dgm:pt>
-    <dgm:pt modelId="{2DCD9DDB-175E-4941-A9CC-3968777E9C33}">
-      <dgm:prSet/>
-      <dgm:spPr>
-        <a:solidFill>
-          <a:srgbClr val="FFFAEF">
-            <a:alpha val="90000"/>
-          </a:srgbClr>
-        </a:solidFill>
-      </dgm:spPr>
-      <dgm:t>
-        <a:bodyPr/>
-        <a:lstStyle/>
-        <a:p>
-          <a:pPr>
-            <a:buNone/>
-          </a:pPr>
-          <a:endParaRPr lang="en-US" dirty="0"/>
-        </a:p>
-      </dgm:t>
-    </dgm:pt>
-    <dgm:pt modelId="{A660DBE3-BFC0-4334-BC1B-24BBEAA4886C}" type="sibTrans" cxnId="{45BADC90-1BEB-4E18-8E43-4B5414B02C6A}">
-      <dgm:prSet/>
-      <dgm:spPr/>
-      <dgm:t>
-        <a:bodyPr/>
-        <a:lstStyle/>
-        <a:p>
-          <a:endParaRPr lang="it-IT"/>
-        </a:p>
-      </dgm:t>
-    </dgm:pt>
-    <dgm:pt modelId="{D20D7FDE-0E23-409C-9D26-4E8D3B54159C}" type="parTrans" cxnId="{45BADC90-1BEB-4E18-8E43-4B5414B02C6A}">
-      <dgm:prSet/>
-      <dgm:spPr/>
-      <dgm:t>
-        <a:bodyPr/>
-        <a:lstStyle/>
-        <a:p>
-          <a:endParaRPr lang="it-IT"/>
-        </a:p>
-      </dgm:t>
-    </dgm:pt>
     <dgm:pt modelId="{BA6B229E-3562-42CB-9BDE-9840C2EAABCE}">
-      <dgm:prSet/>
+      <dgm:prSet custT="1"/>
       <dgm:spPr>
         <a:solidFill>
           <a:srgbClr val="FFFAEF">
@@ -5075,10 +4847,10 @@
             <a:buNone/>
           </a:pPr>
           <a:r>
-            <a:rPr lang="it-IT" b="1" dirty="0"/>
+            <a:rPr lang="it-IT" sz="1800" b="1" dirty="0"/>
             <a:t>• AI Assistant Generativo</a:t>
           </a:r>
-          <a:endParaRPr lang="en-US" dirty="0"/>
+          <a:endParaRPr lang="en-US" sz="1800" dirty="0"/>
         </a:p>
       </dgm:t>
     </dgm:pt>
@@ -5104,205 +4876,8 @@
         </a:p>
       </dgm:t>
     </dgm:pt>
-    <dgm:pt modelId="{F15A7613-7F13-47AE-9A9D-531FF89E08C9}">
-      <dgm:prSet/>
-      <dgm:spPr/>
-      <dgm:t>
-        <a:bodyPr/>
-        <a:lstStyle/>
-        <a:p>
-          <a:pPr>
-            <a:buFont typeface="Arial" panose="020B0604020202020204" pitchFamily="34" charset="0"/>
-            <a:buChar char="–"/>
-          </a:pPr>
-          <a:r>
-            <a:rPr lang="it-IT"/>
-            <a:t>Converse API per generazione testo conversazionale</a:t>
-          </a:r>
-        </a:p>
-      </dgm:t>
-    </dgm:pt>
-    <dgm:pt modelId="{0E80079A-E7C8-46D2-BA7D-0810DEEB2641}" type="sibTrans" cxnId="{34B5FE1C-7742-4652-9590-D783F8DC8A91}">
-      <dgm:prSet/>
-      <dgm:spPr/>
-      <dgm:t>
-        <a:bodyPr/>
-        <a:lstStyle/>
-        <a:p>
-          <a:endParaRPr lang="it-IT"/>
-        </a:p>
-      </dgm:t>
-    </dgm:pt>
-    <dgm:pt modelId="{560ADEAD-12A3-42A1-9F06-6A4A9970C65A}" type="parTrans" cxnId="{34B5FE1C-7742-4652-9590-D783F8DC8A91}">
-      <dgm:prSet/>
-      <dgm:spPr/>
-      <dgm:t>
-        <a:bodyPr/>
-        <a:lstStyle/>
-        <a:p>
-          <a:endParaRPr lang="it-IT"/>
-        </a:p>
-      </dgm:t>
-    </dgm:pt>
-    <dgm:pt modelId="{5F703E27-194A-43A3-A380-2A9162B72DC2}">
-      <dgm:prSet/>
-      <dgm:spPr/>
-      <dgm:t>
-        <a:bodyPr/>
-        <a:lstStyle/>
-        <a:p>
-          <a:pPr>
-            <a:buFont typeface="Arial" panose="020B0604020202020204" pitchFamily="34" charset="0"/>
-            <a:buChar char="–"/>
-          </a:pPr>
-          <a:r>
-            <a:rPr lang="it-IT" dirty="0"/>
-            <a:t>System prompt personalizzato con descrizione azienda e tono</a:t>
-          </a:r>
-        </a:p>
-      </dgm:t>
-    </dgm:pt>
-    <dgm:pt modelId="{05CA66E2-1DEC-499C-AE8F-EB8522F352AC}" type="sibTrans" cxnId="{0810B2E6-C343-4CF5-8A38-64BDF85435AE}">
-      <dgm:prSet/>
-      <dgm:spPr/>
-      <dgm:t>
-        <a:bodyPr/>
-        <a:lstStyle/>
-        <a:p>
-          <a:endParaRPr lang="it-IT"/>
-        </a:p>
-      </dgm:t>
-    </dgm:pt>
-    <dgm:pt modelId="{5F8A755E-B426-489F-954E-6CF0608EF997}" type="parTrans" cxnId="{0810B2E6-C343-4CF5-8A38-64BDF85435AE}">
-      <dgm:prSet/>
-      <dgm:spPr/>
-      <dgm:t>
-        <a:bodyPr/>
-        <a:lstStyle/>
-        <a:p>
-          <a:endParaRPr lang="it-IT"/>
-        </a:p>
-      </dgm:t>
-    </dgm:pt>
-    <dgm:pt modelId="{573BEE00-17A1-4930-80DA-675220DF42B6}">
-      <dgm:prSet/>
-      <dgm:spPr/>
-      <dgm:t>
-        <a:bodyPr/>
-        <a:lstStyle/>
-        <a:p>
-          <a:pPr>
-            <a:buFont typeface="Arial" panose="020B0604020202020204" pitchFamily="34" charset="0"/>
-            <a:buChar char="–"/>
-          </a:pPr>
-          <a:r>
-            <a:rPr lang="it-IT"/>
-            <a:t>Mantenimento contesto conversazione multi-turn</a:t>
-          </a:r>
-        </a:p>
-      </dgm:t>
-    </dgm:pt>
-    <dgm:pt modelId="{8904A72F-E509-44A7-9B2E-77549312C72A}" type="sibTrans" cxnId="{35202EAC-5F14-4E39-974C-FC904AF867BE}">
-      <dgm:prSet/>
-      <dgm:spPr/>
-      <dgm:t>
-        <a:bodyPr/>
-        <a:lstStyle/>
-        <a:p>
-          <a:endParaRPr lang="it-IT"/>
-        </a:p>
-      </dgm:t>
-    </dgm:pt>
-    <dgm:pt modelId="{777DB149-DFF9-40F7-8E7B-FA60BEF58FD0}" type="parTrans" cxnId="{35202EAC-5F14-4E39-974C-FC904AF867BE}">
-      <dgm:prSet/>
-      <dgm:spPr/>
-      <dgm:t>
-        <a:bodyPr/>
-        <a:lstStyle/>
-        <a:p>
-          <a:endParaRPr lang="it-IT"/>
-        </a:p>
-      </dgm:t>
-    </dgm:pt>
-    <dgm:pt modelId="{61458097-4C77-42A6-8D32-882C1B18DFCC}">
-      <dgm:prSet/>
-      <dgm:spPr/>
-      <dgm:t>
-        <a:bodyPr/>
-        <a:lstStyle/>
-        <a:p>
-          <a:pPr>
-            <a:buFont typeface="Arial" panose="020B0604020202020204" pitchFamily="34" charset="0"/>
-            <a:buChar char="–"/>
-          </a:pPr>
-          <a:r>
-            <a:rPr lang="it-IT" dirty="0"/>
-            <a:t>Generazione comunicazioni interne</a:t>
-          </a:r>
-        </a:p>
-      </dgm:t>
-    </dgm:pt>
-    <dgm:pt modelId="{050C9686-ED79-41D7-97FE-2F109DE1A019}" type="sibTrans" cxnId="{E65CA12A-36A9-4F19-A445-FD1547CACE82}">
-      <dgm:prSet/>
-      <dgm:spPr/>
-      <dgm:t>
-        <a:bodyPr/>
-        <a:lstStyle/>
-        <a:p>
-          <a:endParaRPr lang="it-IT"/>
-        </a:p>
-      </dgm:t>
-    </dgm:pt>
-    <dgm:pt modelId="{90240338-094A-4F35-9570-F3E3DD0398FC}" type="parTrans" cxnId="{E65CA12A-36A9-4F19-A445-FD1547CACE82}">
-      <dgm:prSet/>
-      <dgm:spPr/>
-      <dgm:t>
-        <a:bodyPr/>
-        <a:lstStyle/>
-        <a:p>
-          <a:endParaRPr lang="it-IT"/>
-        </a:p>
-      </dgm:t>
-    </dgm:pt>
-    <dgm:pt modelId="{1679F55E-D649-48B2-9C4B-76263E62DB87}">
-      <dgm:prSet/>
-      <dgm:spPr/>
-      <dgm:t>
-        <a:bodyPr/>
-        <a:lstStyle/>
-        <a:p>
-          <a:pPr>
-            <a:buFont typeface="Arial" panose="020B0604020202020204" pitchFamily="34" charset="0"/>
-            <a:buNone/>
-          </a:pPr>
-          <a:endParaRPr lang="it-IT" dirty="0"/>
-        </a:p>
-      </dgm:t>
-    </dgm:pt>
-    <dgm:pt modelId="{6D13BF0E-16AE-4192-AED0-F6BE07135CC9}" type="sibTrans" cxnId="{87052C59-8C24-46BF-849D-B24A39398259}">
-      <dgm:prSet/>
-      <dgm:spPr/>
-      <dgm:t>
-        <a:bodyPr/>
-        <a:lstStyle/>
-        <a:p>
-          <a:endParaRPr lang="it-IT"/>
-        </a:p>
-      </dgm:t>
-    </dgm:pt>
-    <dgm:pt modelId="{7D2F7EFB-3D8E-46E8-B901-1AF738F4CE41}" type="parTrans" cxnId="{87052C59-8C24-46BF-849D-B24A39398259}">
-      <dgm:prSet/>
-      <dgm:spPr/>
-      <dgm:t>
-        <a:bodyPr/>
-        <a:lstStyle/>
-        <a:p>
-          <a:endParaRPr lang="it-IT"/>
-        </a:p>
-      </dgm:t>
-    </dgm:pt>
     <dgm:pt modelId="{7316C1D6-5ECD-48F9-B1A0-54E3D68E01A3}">
-      <dgm:prSet/>
+      <dgm:prSet custT="1"/>
       <dgm:spPr/>
       <dgm:t>
         <a:bodyPr/>
@@ -5313,15 +4888,15 @@
             <a:buChar char="•"/>
           </a:pPr>
           <a:r>
-            <a:rPr lang="it-IT" b="1" dirty="0"/>
+            <a:rPr lang="it-IT" sz="1800" b="1" dirty="0"/>
             <a:t>AI Co-Pilot </a:t>
           </a:r>
           <a:r>
-            <a:rPr lang="it-IT" b="1" dirty="0" err="1"/>
+            <a:rPr lang="it-IT" sz="1800" b="1" dirty="0" err="1"/>
             <a:t>Document</a:t>
           </a:r>
           <a:r>
-            <a:rPr lang="it-IT" b="1" dirty="0"/>
+            <a:rPr lang="it-IT" sz="1800" b="1" dirty="0"/>
             <a:t> Analysis</a:t>
           </a:r>
         </a:p>
@@ -5350,7 +4925,7 @@
       </dgm:t>
     </dgm:pt>
     <dgm:pt modelId="{872B9824-DA74-4B40-B6F5-B5162C203468}">
-      <dgm:prSet/>
+      <dgm:prSet custT="1"/>
       <dgm:spPr/>
       <dgm:t>
         <a:bodyPr/>
@@ -5358,11 +4933,11 @@
         <a:p>
           <a:pPr>
             <a:buFont typeface="Arial" panose="020B0604020202020204" pitchFamily="34" charset="0"/>
-            <a:buChar char="–"/>
+            <a:buChar char="•"/>
           </a:pPr>
           <a:r>
-            <a:rPr lang="it-IT"/>
-            <a:t>OCR e analisi documenti (PDF, PNG, JPEG)</a:t>
+            <a:rPr lang="it-IT" sz="1800" dirty="0"/>
+            <a:t>OCR e analisi documenti (PDF, PNG, JPEG).</a:t>
           </a:r>
         </a:p>
       </dgm:t>
@@ -5390,7 +4965,7 @@
       </dgm:t>
     </dgm:pt>
     <dgm:pt modelId="{B89087CC-4968-4D9D-9400-D9BAF44B38F0}">
-      <dgm:prSet/>
+      <dgm:prSet custT="1"/>
       <dgm:spPr/>
       <dgm:t>
         <a:bodyPr/>
@@ -5398,11 +4973,11 @@
         <a:p>
           <a:pPr>
             <a:buFont typeface="Arial" panose="020B0604020202020204" pitchFamily="34" charset="0"/>
-            <a:buChar char="–"/>
+            <a:buChar char="•"/>
           </a:pPr>
           <a:r>
-            <a:rPr lang="it-IT"/>
-            <a:t>Estrazione dati strutturati: tipo documento, dipendente, importo, date</a:t>
+            <a:rPr lang="it-IT" sz="1800" dirty="0"/>
+            <a:t>Estrazione dati strutturati: tipo documento, dipendente, importo, date.</a:t>
           </a:r>
         </a:p>
       </dgm:t>
@@ -5430,7 +5005,7 @@
       </dgm:t>
     </dgm:pt>
     <dgm:pt modelId="{343EF0D1-E565-4655-813A-A0BAB2E4951B}">
-      <dgm:prSet/>
+      <dgm:prSet custT="1"/>
       <dgm:spPr/>
       <dgm:t>
         <a:bodyPr/>
@@ -5438,11 +5013,19 @@
         <a:p>
           <a:pPr>
             <a:buFont typeface="Arial" panose="020B0604020202020204" pitchFamily="34" charset="0"/>
-            <a:buChar char="–"/>
+            <a:buChar char="•"/>
           </a:pPr>
           <a:r>
-            <a:rPr lang="it-IT" dirty="0"/>
-            <a:t>Output JSON validato per split e dispaccio automatico</a:t>
+            <a:rPr lang="it-IT" sz="1800" dirty="0"/>
+            <a:t>Output JSON validato per split e </a:t>
+          </a:r>
+          <a:r>
+            <a:rPr lang="it-IT" sz="1800" dirty="0" err="1"/>
+            <a:t>dispatch</a:t>
+          </a:r>
+          <a:r>
+            <a:rPr lang="it-IT" sz="1800" dirty="0"/>
+            <a:t> automatico.</a:t>
           </a:r>
         </a:p>
       </dgm:t>
@@ -5459,6 +5042,205 @@
       </dgm:t>
     </dgm:pt>
     <dgm:pt modelId="{D1251FCA-F98D-4FEC-AF4C-52B11EB090F8}" type="parTrans" cxnId="{6B7721DA-4E54-4D2F-81FA-FA47A79D03B8}">
+      <dgm:prSet/>
+      <dgm:spPr/>
+      <dgm:t>
+        <a:bodyPr/>
+        <a:lstStyle/>
+        <a:p>
+          <a:endParaRPr lang="it-IT"/>
+        </a:p>
+      </dgm:t>
+    </dgm:pt>
+    <dgm:pt modelId="{573BEE00-17A1-4930-80DA-675220DF42B6}">
+      <dgm:prSet custT="1"/>
+      <dgm:spPr/>
+      <dgm:t>
+        <a:bodyPr/>
+        <a:lstStyle/>
+        <a:p>
+          <a:pPr>
+            <a:buFont typeface="Arial" panose="020B0604020202020204" pitchFamily="34" charset="0"/>
+            <a:buChar char="•"/>
+          </a:pPr>
+          <a:r>
+            <a:rPr lang="it-IT" sz="1800" dirty="0"/>
+            <a:t>Mantenimento contesto conversazione.</a:t>
+          </a:r>
+        </a:p>
+      </dgm:t>
+    </dgm:pt>
+    <dgm:pt modelId="{777DB149-DFF9-40F7-8E7B-FA60BEF58FD0}" type="parTrans" cxnId="{7BA5C224-61D2-4890-A3B7-20170F103859}">
+      <dgm:prSet/>
+      <dgm:spPr/>
+      <dgm:t>
+        <a:bodyPr/>
+        <a:lstStyle/>
+        <a:p>
+          <a:endParaRPr lang="it-IT"/>
+        </a:p>
+      </dgm:t>
+    </dgm:pt>
+    <dgm:pt modelId="{8904A72F-E509-44A7-9B2E-77549312C72A}" type="sibTrans" cxnId="{7BA5C224-61D2-4890-A3B7-20170F103859}">
+      <dgm:prSet/>
+      <dgm:spPr/>
+      <dgm:t>
+        <a:bodyPr/>
+        <a:lstStyle/>
+        <a:p>
+          <a:endParaRPr lang="it-IT"/>
+        </a:p>
+      </dgm:t>
+    </dgm:pt>
+    <dgm:pt modelId="{BEA2152D-C046-4655-A362-CFBC7923FBEE}">
+      <dgm:prSet custT="1"/>
+      <dgm:spPr/>
+      <dgm:t>
+        <a:bodyPr/>
+        <a:lstStyle/>
+        <a:p>
+          <a:pPr>
+            <a:buFont typeface="Arial" panose="020B0604020202020204" pitchFamily="34" charset="0"/>
+            <a:buChar char="•"/>
+          </a:pPr>
+          <a:r>
+            <a:rPr lang="it-IT" sz="1800" dirty="0"/>
+            <a:t>System prompt personalizzato con descrizione azienda e tono.</a:t>
+          </a:r>
+        </a:p>
+      </dgm:t>
+    </dgm:pt>
+    <dgm:pt modelId="{5105DE5A-A1BF-4AC9-B7DC-8BA5EF154459}" type="parTrans" cxnId="{EBACE240-2157-46A5-AC94-A5E7CF0A2397}">
+      <dgm:prSet/>
+      <dgm:spPr/>
+      <dgm:t>
+        <a:bodyPr/>
+        <a:lstStyle/>
+        <a:p>
+          <a:endParaRPr lang="it-IT"/>
+        </a:p>
+      </dgm:t>
+    </dgm:pt>
+    <dgm:pt modelId="{4150E513-D5EA-4711-B8F3-2BDDA3C4AEDC}" type="sibTrans" cxnId="{EBACE240-2157-46A5-AC94-A5E7CF0A2397}">
+      <dgm:prSet/>
+      <dgm:spPr/>
+      <dgm:t>
+        <a:bodyPr/>
+        <a:lstStyle/>
+        <a:p>
+          <a:endParaRPr lang="it-IT"/>
+        </a:p>
+      </dgm:t>
+    </dgm:pt>
+    <dgm:pt modelId="{CD7A91F7-21B7-4274-88A0-616AD89FFB79}">
+      <dgm:prSet custT="1"/>
+      <dgm:spPr/>
+      <dgm:t>
+        <a:bodyPr/>
+        <a:lstStyle/>
+        <a:p>
+          <a:pPr>
+            <a:buFont typeface="Arial" panose="020B0604020202020204" pitchFamily="34" charset="0"/>
+            <a:buChar char="•"/>
+          </a:pPr>
+          <a:r>
+            <a:rPr lang="it-IT" sz="1800" dirty="0"/>
+            <a:t>Generazione comunicazioni interne di immagini e testo.</a:t>
+          </a:r>
+        </a:p>
+      </dgm:t>
+    </dgm:pt>
+    <dgm:pt modelId="{2D0B7347-550A-49F6-99D8-1B08F73BE624}" type="parTrans" cxnId="{5537C720-33D8-4057-AAC9-1347121BD30B}">
+      <dgm:prSet/>
+      <dgm:spPr/>
+      <dgm:t>
+        <a:bodyPr/>
+        <a:lstStyle/>
+        <a:p>
+          <a:endParaRPr lang="it-IT"/>
+        </a:p>
+      </dgm:t>
+    </dgm:pt>
+    <dgm:pt modelId="{2D1EE887-D981-4797-8693-3CF80DDDDA28}" type="sibTrans" cxnId="{5537C720-33D8-4057-AAC9-1347121BD30B}">
+      <dgm:prSet/>
+      <dgm:spPr/>
+      <dgm:t>
+        <a:bodyPr/>
+        <a:lstStyle/>
+        <a:p>
+          <a:endParaRPr lang="it-IT"/>
+        </a:p>
+      </dgm:t>
+    </dgm:pt>
+    <dgm:pt modelId="{DD2A1A6C-F0EF-4D82-935F-7FAE9ECDE1CF}">
+      <dgm:prSet custT="1"/>
+      <dgm:spPr/>
+      <dgm:t>
+        <a:bodyPr/>
+        <a:lstStyle/>
+        <a:p>
+          <a:pPr>
+            <a:buFont typeface="Arial" panose="020B0604020202020204" pitchFamily="34" charset="0"/>
+            <a:buChar char="•"/>
+          </a:pPr>
+          <a:r>
+            <a:rPr lang="it-IT" sz="1800" dirty="0"/>
+            <a:t>Facilità nel cambiare modello usando API-converse.</a:t>
+          </a:r>
+        </a:p>
+      </dgm:t>
+    </dgm:pt>
+    <dgm:pt modelId="{61076ED3-098D-4554-B3B3-FCA2DAB44033}" type="parTrans" cxnId="{5A3DF7AA-DA19-4FF0-BA7C-C4A7DBAC1D15}">
+      <dgm:prSet/>
+      <dgm:spPr/>
+      <dgm:t>
+        <a:bodyPr/>
+        <a:lstStyle/>
+        <a:p>
+          <a:endParaRPr lang="it-IT"/>
+        </a:p>
+      </dgm:t>
+    </dgm:pt>
+    <dgm:pt modelId="{0B729141-53CC-4ED0-8D02-2659E519D0CC}" type="sibTrans" cxnId="{5A3DF7AA-DA19-4FF0-BA7C-C4A7DBAC1D15}">
+      <dgm:prSet/>
+      <dgm:spPr/>
+      <dgm:t>
+        <a:bodyPr/>
+        <a:lstStyle/>
+        <a:p>
+          <a:endParaRPr lang="it-IT"/>
+        </a:p>
+      </dgm:t>
+    </dgm:pt>
+    <dgm:pt modelId="{0628DF13-1EE6-4170-BB06-ACFCED3746DF}">
+      <dgm:prSet custT="1"/>
+      <dgm:spPr>
+        <a:solidFill>
+          <a:srgbClr val="FFFAEF">
+            <a:alpha val="90000"/>
+          </a:srgbClr>
+        </a:solidFill>
+      </dgm:spPr>
+      <dgm:t>
+        <a:bodyPr/>
+        <a:lstStyle/>
+        <a:p>
+          <a:endParaRPr lang="en-US" sz="1800" dirty="0"/>
+        </a:p>
+      </dgm:t>
+    </dgm:pt>
+    <dgm:pt modelId="{A933E876-A9A0-43DB-8592-D03B81E4AC49}" type="parTrans" cxnId="{75D38A8B-90A4-48A0-9023-AD539D3DD23F}">
+      <dgm:prSet/>
+      <dgm:spPr/>
+      <dgm:t>
+        <a:bodyPr/>
+        <a:lstStyle/>
+        <a:p>
+          <a:endParaRPr lang="it-IT"/>
+        </a:p>
+      </dgm:t>
+    </dgm:pt>
+    <dgm:pt modelId="{E2304817-FDF2-4433-AFDF-B07F2740A536}" type="sibTrans" cxnId="{75D38A8B-90A4-48A0-9023-AD539D3DD23F}">
       <dgm:prSet/>
       <dgm:spPr/>
       <dgm:t>
@@ -5488,7 +5270,7 @@
       <dgm:spPr/>
     </dgm:pt>
     <dgm:pt modelId="{EF67F11A-FCD0-4E59-A23F-17BCC3FB1182}" type="pres">
-      <dgm:prSet presAssocID="{EE76E364-6A46-492A-9FD7-63C775ADA808}" presName="parentText" presStyleLbl="node1" presStyleIdx="0" presStyleCnt="1">
+      <dgm:prSet presAssocID="{EE76E364-6A46-492A-9FD7-63C775ADA808}" presName="parentText" presStyleLbl="node1" presStyleIdx="0" presStyleCnt="1" custLinFactNeighborX="-823" custLinFactNeighborY="-39063">
         <dgm:presLayoutVars>
           <dgm:chMax val="0"/>
           <dgm:bulletEnabled val="1"/>
@@ -5510,39 +5292,37 @@
     </dgm:pt>
   </dgm:ptLst>
   <dgm:cxnLst>
-    <dgm:cxn modelId="{2A270F06-6AE0-4AE2-8251-CC80407F0F76}" type="presOf" srcId="{FB7856FD-14F6-497F-A96F-439DE861ECA4}" destId="{8A748C3E-CE62-4E92-A0FE-1F5548AC9D02}" srcOrd="0" destOrd="0" presId="urn:microsoft.com/office/officeart/2005/8/layout/list1"/>
-    <dgm:cxn modelId="{854A3A06-D304-4DF2-804D-CBCD835EE301}" srcId="{EE76E364-6A46-492A-9FD7-63C775ADA808}" destId="{7316C1D6-5ECD-48F9-B1A0-54E3D68E01A3}" srcOrd="4" destOrd="0" parTransId="{91CBBFC0-E109-45E8-AE61-AE718F4BCCE2}" sibTransId="{F262D59A-314C-42C3-882C-D827C4AB90C3}"/>
-    <dgm:cxn modelId="{820B0608-61EF-4448-ACAC-A1FD73EC44C5}" type="presOf" srcId="{EE76E364-6A46-492A-9FD7-63C775ADA808}" destId="{0E75AC4A-956D-493C-A82B-572CF3B1603B}" srcOrd="0" destOrd="0" presId="urn:microsoft.com/office/officeart/2005/8/layout/list1"/>
-    <dgm:cxn modelId="{84456A0F-5AE2-488D-A8D5-EE9F60F6E51F}" type="presOf" srcId="{2DCD9DDB-175E-4941-A9CC-3968777E9C33}" destId="{8A748C3E-CE62-4E92-A0FE-1F5548AC9D02}" srcOrd="0" destOrd="1" presId="urn:microsoft.com/office/officeart/2005/8/layout/list1"/>
-    <dgm:cxn modelId="{34B5FE1C-7742-4652-9590-D783F8DC8A91}" srcId="{BA6B229E-3562-42CB-9BDE-9840C2EAABCE}" destId="{F15A7613-7F13-47AE-9A9D-531FF89E08C9}" srcOrd="0" destOrd="0" parTransId="{560ADEAD-12A3-42A1-9F06-6A4A9970C65A}" sibTransId="{0E80079A-E7C8-46D2-BA7D-0810DEEB2641}"/>
-    <dgm:cxn modelId="{E65CA12A-36A9-4F19-A445-FD1547CACE82}" srcId="{BA6B229E-3562-42CB-9BDE-9840C2EAABCE}" destId="{61458097-4C77-42A6-8D32-882C1B18DFCC}" srcOrd="3" destOrd="0" parTransId="{90240338-094A-4F35-9570-F3E3DD0398FC}" sibTransId="{050C9686-ED79-41D7-97FE-2F109DE1A019}"/>
-    <dgm:cxn modelId="{EC00DE42-10F8-4885-B700-1B3CDE89098C}" type="presOf" srcId="{BA6B229E-3562-42CB-9BDE-9840C2EAABCE}" destId="{8A748C3E-CE62-4E92-A0FE-1F5548AC9D02}" srcOrd="0" destOrd="2" presId="urn:microsoft.com/office/officeart/2005/8/layout/list1"/>
-    <dgm:cxn modelId="{20413846-249F-4E5D-9D7F-CC0E76057FAC}" type="presOf" srcId="{573BEE00-17A1-4930-80DA-675220DF42B6}" destId="{8A748C3E-CE62-4E92-A0FE-1F5548AC9D02}" srcOrd="0" destOrd="5" presId="urn:microsoft.com/office/officeart/2005/8/layout/list1"/>
-    <dgm:cxn modelId="{39637C4A-677F-47CB-825B-D8F1C2923F5C}" type="presOf" srcId="{7316C1D6-5ECD-48F9-B1A0-54E3D68E01A3}" destId="{8A748C3E-CE62-4E92-A0FE-1F5548AC9D02}" srcOrd="0" destOrd="8" presId="urn:microsoft.com/office/officeart/2005/8/layout/list1"/>
+    <dgm:cxn modelId="{854A3A06-D304-4DF2-804D-CBCD835EE301}" srcId="{EE76E364-6A46-492A-9FD7-63C775ADA808}" destId="{7316C1D6-5ECD-48F9-B1A0-54E3D68E01A3}" srcOrd="3" destOrd="0" parTransId="{91CBBFC0-E109-45E8-AE61-AE718F4BCCE2}" sibTransId="{F262D59A-314C-42C3-882C-D827C4AB90C3}"/>
+    <dgm:cxn modelId="{D6B19616-8106-4FE0-A74D-99E25152AF5A}" type="presOf" srcId="{7316C1D6-5ECD-48F9-B1A0-54E3D68E01A3}" destId="{8A748C3E-CE62-4E92-A0FE-1F5548AC9D02}" srcOrd="0" destOrd="7" presId="urn:microsoft.com/office/officeart/2005/8/layout/list1"/>
+    <dgm:cxn modelId="{2B933718-A7CE-4C86-B563-48EC064ABFFB}" type="presOf" srcId="{CD7A91F7-21B7-4274-88A0-616AD89FFB79}" destId="{8A748C3E-CE62-4E92-A0FE-1F5548AC9D02}" srcOrd="0" destOrd="6" presId="urn:microsoft.com/office/officeart/2005/8/layout/list1"/>
+    <dgm:cxn modelId="{5537C720-33D8-4057-AAC9-1347121BD30B}" srcId="{BA6B229E-3562-42CB-9BDE-9840C2EAABCE}" destId="{CD7A91F7-21B7-4274-88A0-616AD89FFB79}" srcOrd="3" destOrd="0" parTransId="{2D0B7347-550A-49F6-99D8-1B08F73BE624}" sibTransId="{2D1EE887-D981-4797-8693-3CF80DDDDA28}"/>
+    <dgm:cxn modelId="{F4AE0721-75F1-45E9-853B-6392EFB32455}" type="presOf" srcId="{0628DF13-1EE6-4170-BB06-ACFCED3746DF}" destId="{8A748C3E-CE62-4E92-A0FE-1F5548AC9D02}" srcOrd="0" destOrd="1" presId="urn:microsoft.com/office/officeart/2005/8/layout/list1"/>
+    <dgm:cxn modelId="{7BA5C224-61D2-4890-A3B7-20170F103859}" srcId="{BA6B229E-3562-42CB-9BDE-9840C2EAABCE}" destId="{573BEE00-17A1-4930-80DA-675220DF42B6}" srcOrd="2" destOrd="0" parTransId="{777DB149-DFF9-40F7-8E7B-FA60BEF58FD0}" sibTransId="{8904A72F-E509-44A7-9B2E-77549312C72A}"/>
+    <dgm:cxn modelId="{0258732E-D1CF-421D-B964-1D8C69E3AAFD}" type="presOf" srcId="{EE76E364-6A46-492A-9FD7-63C775ADA808}" destId="{0E75AC4A-956D-493C-A82B-572CF3B1603B}" srcOrd="0" destOrd="0" presId="urn:microsoft.com/office/officeart/2005/8/layout/list1"/>
+    <dgm:cxn modelId="{EBACE240-2157-46A5-AC94-A5E7CF0A2397}" srcId="{BA6B229E-3562-42CB-9BDE-9840C2EAABCE}" destId="{BEA2152D-C046-4655-A362-CFBC7923FBEE}" srcOrd="0" destOrd="0" parTransId="{5105DE5A-A1BF-4AC9-B7DC-8BA5EF154459}" sibTransId="{4150E513-D5EA-4711-B8F3-2BDDA3C4AEDC}"/>
+    <dgm:cxn modelId="{2EB6B66A-D47B-4F6E-840F-03DF5819B18A}" type="presOf" srcId="{573BEE00-17A1-4930-80DA-675220DF42B6}" destId="{8A748C3E-CE62-4E92-A0FE-1F5548AC9D02}" srcOrd="0" destOrd="5" presId="urn:microsoft.com/office/officeart/2005/8/layout/list1"/>
     <dgm:cxn modelId="{60C19F6E-51D4-469F-8CA2-D99A70A515A1}" srcId="{EE76E364-6A46-492A-9FD7-63C775ADA808}" destId="{BA6B229E-3562-42CB-9BDE-9840C2EAABCE}" srcOrd="2" destOrd="0" parTransId="{70A3C826-6850-42FF-83C7-F9DD4F109BBD}" sibTransId="{90271237-C794-41DF-86D9-A2E26E60317C}"/>
-    <dgm:cxn modelId="{6AA96252-4617-4C08-8FF2-7098BA23B694}" type="presOf" srcId="{1679F55E-D649-48B2-9C4B-76263E62DB87}" destId="{8A748C3E-CE62-4E92-A0FE-1F5548AC9D02}" srcOrd="0" destOrd="7" presId="urn:microsoft.com/office/officeart/2005/8/layout/list1"/>
-    <dgm:cxn modelId="{148AF175-59E1-44CA-B663-939A813C060F}" type="presOf" srcId="{343EF0D1-E565-4655-813A-A0BAB2E4951B}" destId="{8A748C3E-CE62-4E92-A0FE-1F5548AC9D02}" srcOrd="0" destOrd="11" presId="urn:microsoft.com/office/officeart/2005/8/layout/list1"/>
-    <dgm:cxn modelId="{87052C59-8C24-46BF-849D-B24A39398259}" srcId="{EE76E364-6A46-492A-9FD7-63C775ADA808}" destId="{1679F55E-D649-48B2-9C4B-76263E62DB87}" srcOrd="3" destOrd="0" parTransId="{7D2F7EFB-3D8E-46E8-B901-1AF738F4CE41}" sibTransId="{6D13BF0E-16AE-4192-AED0-F6BE07135CC9}"/>
     <dgm:cxn modelId="{F609747B-AE71-4ACA-93A0-5C6C9FA2C6E1}" srcId="{EE76E364-6A46-492A-9FD7-63C775ADA808}" destId="{FB7856FD-14F6-497F-A96F-439DE861ECA4}" srcOrd="0" destOrd="0" parTransId="{B2A71A46-24A2-44C1-B6DD-257439AFBC0A}" sibTransId="{AED585D0-E158-48D1-8037-5DB08D2C892B}"/>
-    <dgm:cxn modelId="{44F1437F-C746-4481-9ADB-1CB2CD734DE5}" type="presOf" srcId="{EE76E364-6A46-492A-9FD7-63C775ADA808}" destId="{EF67F11A-FCD0-4E59-A23F-17BCC3FB1182}" srcOrd="1" destOrd="0" presId="urn:microsoft.com/office/officeart/2005/8/layout/list1"/>
     <dgm:cxn modelId="{F5B37F8A-E7BD-4E4D-ABD3-AEB11F341F98}" srcId="{7316C1D6-5ECD-48F9-B1A0-54E3D68E01A3}" destId="{872B9824-DA74-4B40-B6F5-B5162C203468}" srcOrd="0" destOrd="0" parTransId="{1B568AF4-DEB1-4D63-A26E-5F8644619EDC}" sibTransId="{C84683A7-4B5E-4805-9BF5-AA75C1CD7896}"/>
-    <dgm:cxn modelId="{45BADC90-1BEB-4E18-8E43-4B5414B02C6A}" srcId="{EE76E364-6A46-492A-9FD7-63C775ADA808}" destId="{2DCD9DDB-175E-4941-A9CC-3968777E9C33}" srcOrd="1" destOrd="0" parTransId="{D20D7FDE-0E23-409C-9D26-4E8D3B54159C}" sibTransId="{A660DBE3-BFC0-4334-BC1B-24BBEAA4886C}"/>
-    <dgm:cxn modelId="{D5EDF6A6-8802-4D34-8932-6452933E4646}" type="presOf" srcId="{872B9824-DA74-4B40-B6F5-B5162C203468}" destId="{8A748C3E-CE62-4E92-A0FE-1F5548AC9D02}" srcOrd="0" destOrd="9" presId="urn:microsoft.com/office/officeart/2005/8/layout/list1"/>
+    <dgm:cxn modelId="{75D38A8B-90A4-48A0-9023-AD539D3DD23F}" srcId="{EE76E364-6A46-492A-9FD7-63C775ADA808}" destId="{0628DF13-1EE6-4170-BB06-ACFCED3746DF}" srcOrd="1" destOrd="0" parTransId="{A933E876-A9A0-43DB-8592-D03B81E4AC49}" sibTransId="{E2304817-FDF2-4433-AFDF-B07F2740A536}"/>
     <dgm:cxn modelId="{C2D045A7-F4AF-4A1A-B988-A0484F0B9C95}" srcId="{7316C1D6-5ECD-48F9-B1A0-54E3D68E01A3}" destId="{B89087CC-4968-4D9D-9400-D9BAF44B38F0}" srcOrd="1" destOrd="0" parTransId="{52C65161-EA61-4E7A-81E3-DD54CBB1FBE4}" sibTransId="{63645E5B-424B-4B3F-908E-DAFD032AAE07}"/>
     <dgm:cxn modelId="{88D6E6A7-1062-4D86-9D47-5679D8845B52}" type="presOf" srcId="{228ADC0D-83DA-40CE-9EF2-B2A23B2BA12F}" destId="{529C8736-509C-426A-B1AF-D9FE39FB5B28}" srcOrd="0" destOrd="0" presId="urn:microsoft.com/office/officeart/2005/8/layout/list1"/>
-    <dgm:cxn modelId="{35202EAC-5F14-4E39-974C-FC904AF867BE}" srcId="{BA6B229E-3562-42CB-9BDE-9840C2EAABCE}" destId="{573BEE00-17A1-4930-80DA-675220DF42B6}" srcOrd="2" destOrd="0" parTransId="{777DB149-DFF9-40F7-8E7B-FA60BEF58FD0}" sibTransId="{8904A72F-E509-44A7-9B2E-77549312C72A}"/>
-    <dgm:cxn modelId="{AACD3FB9-8F13-4D26-8A56-879B25B1E89E}" type="presOf" srcId="{B89087CC-4968-4D9D-9400-D9BAF44B38F0}" destId="{8A748C3E-CE62-4E92-A0FE-1F5548AC9D02}" srcOrd="0" destOrd="10" presId="urn:microsoft.com/office/officeart/2005/8/layout/list1"/>
+    <dgm:cxn modelId="{5A3DF7AA-DA19-4FF0-BA7C-C4A7DBAC1D15}" srcId="{BA6B229E-3562-42CB-9BDE-9840C2EAABCE}" destId="{DD2A1A6C-F0EF-4D82-935F-7FAE9ECDE1CF}" srcOrd="1" destOrd="0" parTransId="{61076ED3-098D-4554-B3B3-FCA2DAB44033}" sibTransId="{0B729141-53CC-4ED0-8D02-2659E519D0CC}"/>
+    <dgm:cxn modelId="{214092B1-942B-4ADA-B165-81847842D397}" type="presOf" srcId="{DD2A1A6C-F0EF-4D82-935F-7FAE9ECDE1CF}" destId="{8A748C3E-CE62-4E92-A0FE-1F5548AC9D02}" srcOrd="0" destOrd="4" presId="urn:microsoft.com/office/officeart/2005/8/layout/list1"/>
+    <dgm:cxn modelId="{CD95BCB4-B697-4D00-A3DC-13A17A4E477B}" type="presOf" srcId="{872B9824-DA74-4B40-B6F5-B5162C203468}" destId="{8A748C3E-CE62-4E92-A0FE-1F5548AC9D02}" srcOrd="0" destOrd="8" presId="urn:microsoft.com/office/officeart/2005/8/layout/list1"/>
+    <dgm:cxn modelId="{A87592C6-EE6F-4ACC-B9A5-8FAF6243C283}" type="presOf" srcId="{B89087CC-4968-4D9D-9400-D9BAF44B38F0}" destId="{8A748C3E-CE62-4E92-A0FE-1F5548AC9D02}" srcOrd="0" destOrd="9" presId="urn:microsoft.com/office/officeart/2005/8/layout/list1"/>
+    <dgm:cxn modelId="{F37947CC-2732-4780-8622-117936D02045}" type="presOf" srcId="{BEA2152D-C046-4655-A362-CFBC7923FBEE}" destId="{8A748C3E-CE62-4E92-A0FE-1F5548AC9D02}" srcOrd="0" destOrd="3" presId="urn:microsoft.com/office/officeart/2005/8/layout/list1"/>
+    <dgm:cxn modelId="{793FDACF-BAAB-4111-960F-DD86F291382E}" type="presOf" srcId="{FB7856FD-14F6-497F-A96F-439DE861ECA4}" destId="{8A748C3E-CE62-4E92-A0FE-1F5548AC9D02}" srcOrd="0" destOrd="0" presId="urn:microsoft.com/office/officeart/2005/8/layout/list1"/>
+    <dgm:cxn modelId="{62B3F3D5-63C9-4915-94CA-40BB999D8B6F}" type="presOf" srcId="{EE76E364-6A46-492A-9FD7-63C775ADA808}" destId="{EF67F11A-FCD0-4E59-A23F-17BCC3FB1182}" srcOrd="1" destOrd="0" presId="urn:microsoft.com/office/officeart/2005/8/layout/list1"/>
+    <dgm:cxn modelId="{639E18D9-6803-44BB-85FD-CF7E5963CA54}" type="presOf" srcId="{BA6B229E-3562-42CB-9BDE-9840C2EAABCE}" destId="{8A748C3E-CE62-4E92-A0FE-1F5548AC9D02}" srcOrd="0" destOrd="2" presId="urn:microsoft.com/office/officeart/2005/8/layout/list1"/>
     <dgm:cxn modelId="{6B7721DA-4E54-4D2F-81FA-FA47A79D03B8}" srcId="{7316C1D6-5ECD-48F9-B1A0-54E3D68E01A3}" destId="{343EF0D1-E565-4655-813A-A0BAB2E4951B}" srcOrd="2" destOrd="0" parTransId="{D1251FCA-F98D-4FEC-AF4C-52B11EB090F8}" sibTransId="{A6D716EA-7CDD-4A41-A939-9B7695890F9F}"/>
-    <dgm:cxn modelId="{CD10DCE2-5952-4248-BC38-B732392C23A5}" type="presOf" srcId="{F15A7613-7F13-47AE-9A9D-531FF89E08C9}" destId="{8A748C3E-CE62-4E92-A0FE-1F5548AC9D02}" srcOrd="0" destOrd="3" presId="urn:microsoft.com/office/officeart/2005/8/layout/list1"/>
-    <dgm:cxn modelId="{0810B2E6-C343-4CF5-8A38-64BDF85435AE}" srcId="{BA6B229E-3562-42CB-9BDE-9840C2EAABCE}" destId="{5F703E27-194A-43A3-A380-2A9162B72DC2}" srcOrd="1" destOrd="0" parTransId="{5F8A755E-B426-489F-954E-6CF0608EF997}" sibTransId="{05CA66E2-1DEC-499C-AE8F-EB8522F352AC}"/>
     <dgm:cxn modelId="{8ADAB9E6-BB3B-4581-9B45-07948A4AEA67}" srcId="{228ADC0D-83DA-40CE-9EF2-B2A23B2BA12F}" destId="{EE76E364-6A46-492A-9FD7-63C775ADA808}" srcOrd="0" destOrd="0" parTransId="{522B9AE2-1358-4DCB-B21B-51AD7A4CC3B6}" sibTransId="{119AEC78-9891-4081-85AD-AAE5114E48ED}"/>
-    <dgm:cxn modelId="{0B6FFFEC-36D1-4559-8EF6-AB2121C6B9EF}" type="presOf" srcId="{5F703E27-194A-43A3-A380-2A9162B72DC2}" destId="{8A748C3E-CE62-4E92-A0FE-1F5548AC9D02}" srcOrd="0" destOrd="4" presId="urn:microsoft.com/office/officeart/2005/8/layout/list1"/>
-    <dgm:cxn modelId="{023355FF-EB37-4CA0-9956-B0F7DCAA3F57}" type="presOf" srcId="{61458097-4C77-42A6-8D32-882C1B18DFCC}" destId="{8A748C3E-CE62-4E92-A0FE-1F5548AC9D02}" srcOrd="0" destOrd="6" presId="urn:microsoft.com/office/officeart/2005/8/layout/list1"/>
-    <dgm:cxn modelId="{3DF822E8-82B6-403D-8F70-687BE16F89F8}" type="presParOf" srcId="{529C8736-509C-426A-B1AF-D9FE39FB5B28}" destId="{8BC7EA25-256B-410A-8E19-CC15A19D412A}" srcOrd="0" destOrd="0" presId="urn:microsoft.com/office/officeart/2005/8/layout/list1"/>
-    <dgm:cxn modelId="{B01720AC-BA89-4B9D-8EF6-202BAF999D3A}" type="presParOf" srcId="{8BC7EA25-256B-410A-8E19-CC15A19D412A}" destId="{0E75AC4A-956D-493C-A82B-572CF3B1603B}" srcOrd="0" destOrd="0" presId="urn:microsoft.com/office/officeart/2005/8/layout/list1"/>
-    <dgm:cxn modelId="{1F994049-92C7-4DA1-B7AE-5EB22743947C}" type="presParOf" srcId="{8BC7EA25-256B-410A-8E19-CC15A19D412A}" destId="{EF67F11A-FCD0-4E59-A23F-17BCC3FB1182}" srcOrd="1" destOrd="0" presId="urn:microsoft.com/office/officeart/2005/8/layout/list1"/>
-    <dgm:cxn modelId="{B019D997-1CC2-4B50-91BB-8AD70ECA9F38}" type="presParOf" srcId="{529C8736-509C-426A-B1AF-D9FE39FB5B28}" destId="{E84E3A97-5D14-4C15-B06F-E00215B154CE}" srcOrd="1" destOrd="0" presId="urn:microsoft.com/office/officeart/2005/8/layout/list1"/>
-    <dgm:cxn modelId="{4BD1268F-9F9E-46C2-AD3B-342BE0982D81}" type="presParOf" srcId="{529C8736-509C-426A-B1AF-D9FE39FB5B28}" destId="{8A748C3E-CE62-4E92-A0FE-1F5548AC9D02}" srcOrd="2" destOrd="0" presId="urn:microsoft.com/office/officeart/2005/8/layout/list1"/>
+    <dgm:cxn modelId="{AB1ED4FA-8D38-4D35-9547-EF9814A3E7FC}" type="presOf" srcId="{343EF0D1-E565-4655-813A-A0BAB2E4951B}" destId="{8A748C3E-CE62-4E92-A0FE-1F5548AC9D02}" srcOrd="0" destOrd="10" presId="urn:microsoft.com/office/officeart/2005/8/layout/list1"/>
+    <dgm:cxn modelId="{E6C9B51C-9D9C-4349-8B01-220E16E3E035}" type="presParOf" srcId="{529C8736-509C-426A-B1AF-D9FE39FB5B28}" destId="{8BC7EA25-256B-410A-8E19-CC15A19D412A}" srcOrd="0" destOrd="0" presId="urn:microsoft.com/office/officeart/2005/8/layout/list1"/>
+    <dgm:cxn modelId="{1A8E06A9-881C-438B-AC9E-E5456B8C2A9B}" type="presParOf" srcId="{8BC7EA25-256B-410A-8E19-CC15A19D412A}" destId="{0E75AC4A-956D-493C-A82B-572CF3B1603B}" srcOrd="0" destOrd="0" presId="urn:microsoft.com/office/officeart/2005/8/layout/list1"/>
+    <dgm:cxn modelId="{452DA45A-C2F5-4718-9F26-2EEA5A93C355}" type="presParOf" srcId="{8BC7EA25-256B-410A-8E19-CC15A19D412A}" destId="{EF67F11A-FCD0-4E59-A23F-17BCC3FB1182}" srcOrd="1" destOrd="0" presId="urn:microsoft.com/office/officeart/2005/8/layout/list1"/>
+    <dgm:cxn modelId="{5E5ED27F-2AA5-4494-9356-C17CCA4FB3E7}" type="presParOf" srcId="{529C8736-509C-426A-B1AF-D9FE39FB5B28}" destId="{E84E3A97-5D14-4C15-B06F-E00215B154CE}" srcOrd="1" destOrd="0" presId="urn:microsoft.com/office/officeart/2005/8/layout/list1"/>
+    <dgm:cxn modelId="{A2A9253D-2ECB-4022-A304-26101323D8B2}" type="presParOf" srcId="{529C8736-509C-426A-B1AF-D9FE39FB5B28}" destId="{8A748C3E-CE62-4E92-A0FE-1F5548AC9D02}" srcOrd="2" destOrd="0" presId="urn:microsoft.com/office/officeart/2005/8/layout/list1"/>
   </dgm:cxnLst>
   <dgm:bg/>
   <dgm:whole/>
@@ -6293,8 +6073,8 @@
       </dsp:nvSpPr>
       <dsp:spPr>
         <a:xfrm>
-          <a:off x="0" y="603912"/>
-          <a:ext cx="4698998" cy="3874500"/>
+          <a:off x="0" y="1039962"/>
+          <a:ext cx="4698998" cy="3150000"/>
         </a:xfrm>
         <a:prstGeom prst="rect">
           <a:avLst/>
@@ -6330,12 +6110,12 @@
         <a:fontRef idx="minor"/>
       </dsp:style>
       <dsp:txBody>
-        <a:bodyPr spcFirstLastPara="0" vert="horz" wrap="square" lIns="364694" tIns="312420" rIns="364694" bIns="106680" numCol="1" spcCol="1270" anchor="t" anchorCtr="0">
+        <a:bodyPr spcFirstLastPara="0" vert="horz" wrap="square" lIns="364694" tIns="520700" rIns="364694" bIns="128016" numCol="1" spcCol="1270" anchor="t" anchorCtr="0">
           <a:noAutofit/>
         </a:bodyPr>
         <a:lstStyle/>
         <a:p>
-          <a:pPr marL="114300" lvl="1" indent="-114300" algn="l" defTabSz="666750">
+          <a:pPr marL="171450" lvl="1" indent="-171450" algn="l" defTabSz="800100">
             <a:lnSpc>
               <a:spcPct val="90000"/>
             </a:lnSpc>
@@ -6348,129 +6128,13 @@
             <a:buChar char="•"/>
           </a:pPr>
           <a:r>
-            <a:rPr lang="it-IT" sz="1500" b="1" kern="1200" dirty="0"/>
+            <a:rPr lang="it-IT" sz="1800" b="1" kern="1200" dirty="0"/>
             <a:t>Struttura dati relazionale</a:t>
           </a:r>
-          <a:endParaRPr lang="en-US" sz="1500" kern="1200" dirty="0"/>
+          <a:endParaRPr lang="en-US" sz="1800" kern="1200" dirty="0"/>
         </a:p>
         <a:p>
-          <a:pPr marL="228600" lvl="2" indent="-114300" algn="l" defTabSz="666750">
-            <a:lnSpc>
-              <a:spcPct val="90000"/>
-            </a:lnSpc>
-            <a:spcBef>
-              <a:spcPct val="0"/>
-            </a:spcBef>
-            <a:spcAft>
-              <a:spcPct val="15000"/>
-            </a:spcAft>
-            <a:buFont typeface="Arial" panose="020B0604020202020204" pitchFamily="34" charset="0"/>
-            <a:buChar char="–"/>
-          </a:pPr>
-          <a:r>
-            <a:rPr lang="it-IT" sz="1500" kern="1200"/>
-            <a:t>Company: aziende che utilizzano la piattaforma</a:t>
-          </a:r>
-        </a:p>
-        <a:p>
-          <a:pPr marL="228600" lvl="2" indent="-114300" algn="l" defTabSz="666750">
-            <a:lnSpc>
-              <a:spcPct val="90000"/>
-            </a:lnSpc>
-            <a:spcBef>
-              <a:spcPct val="0"/>
-            </a:spcBef>
-            <a:spcAft>
-              <a:spcPct val="15000"/>
-            </a:spcAft>
-            <a:buFont typeface="Arial" panose="020B0604020202020204" pitchFamily="34" charset="0"/>
-            <a:buChar char="–"/>
-          </a:pPr>
-          <a:r>
-            <a:rPr lang="it-IT" sz="1500" kern="1200" dirty="0" err="1"/>
-            <a:t>Conversation</a:t>
-          </a:r>
-          <a:r>
-            <a:rPr lang="it-IT" sz="1500" kern="1200" dirty="0"/>
-            <a:t> + Message: storico conversazioni AI con contesto</a:t>
-          </a:r>
-        </a:p>
-        <a:p>
-          <a:pPr marL="228600" lvl="2" indent="-114300" algn="l" defTabSz="666750">
-            <a:lnSpc>
-              <a:spcPct val="90000"/>
-            </a:lnSpc>
-            <a:spcBef>
-              <a:spcPct val="0"/>
-            </a:spcBef>
-            <a:spcAft>
-              <a:spcPct val="15000"/>
-            </a:spcAft>
-            <a:buFont typeface="Arial" panose="020B0604020202020204" pitchFamily="34" charset="0"/>
-            <a:buChar char="–"/>
-          </a:pPr>
-          <a:r>
-            <a:rPr lang="it-IT" sz="1500" kern="1200"/>
-            <a:t>Tone: toni comunicativi personalizzati per azienda</a:t>
-          </a:r>
-        </a:p>
-        <a:p>
-          <a:pPr marL="228600" lvl="2" indent="-114300" algn="l" defTabSz="666750">
-            <a:lnSpc>
-              <a:spcPct val="90000"/>
-            </a:lnSpc>
-            <a:spcBef>
-              <a:spcPct val="0"/>
-            </a:spcBef>
-            <a:spcAft>
-              <a:spcPct val="15000"/>
-            </a:spcAft>
-            <a:buFont typeface="Arial" panose="020B0604020202020204" pitchFamily="34" charset="0"/>
-            <a:buChar char="–"/>
-          </a:pPr>
-          <a:r>
-            <a:rPr lang="it-IT" sz="1500" kern="1200" dirty="0" err="1"/>
-            <a:t>Document</a:t>
-          </a:r>
-          <a:r>
-            <a:rPr lang="it-IT" sz="1500" kern="1200" dirty="0"/>
-            <a:t>: metadati documenti con status (</a:t>
-          </a:r>
-          <a:r>
-            <a:rPr lang="it-IT" sz="1500" kern="1200" dirty="0" err="1"/>
-            <a:t>pending</a:t>
-          </a:r>
-          <a:r>
-            <a:rPr lang="it-IT" sz="1500" kern="1200" dirty="0"/>
-            <a:t>/processing/</a:t>
-          </a:r>
-          <a:r>
-            <a:rPr lang="it-IT" sz="1500" kern="1200" dirty="0" err="1"/>
-            <a:t>completed</a:t>
-          </a:r>
-          <a:r>
-            <a:rPr lang="it-IT" sz="1500" kern="1200" dirty="0"/>
-            <a:t>)</a:t>
-          </a:r>
-        </a:p>
-        <a:p>
-          <a:pPr marL="114300" lvl="1" indent="-114300" algn="l" defTabSz="666750">
-            <a:lnSpc>
-              <a:spcPct val="90000"/>
-            </a:lnSpc>
-            <a:spcBef>
-              <a:spcPct val="0"/>
-            </a:spcBef>
-            <a:spcAft>
-              <a:spcPct val="15000"/>
-            </a:spcAft>
-            <a:buFont typeface="Arial" panose="020B0604020202020204" pitchFamily="34" charset="0"/>
-            <a:buNone/>
-          </a:pPr>
-          <a:endParaRPr lang="it-IT" sz="1500" kern="1200" dirty="0"/>
-        </a:p>
-        <a:p>
-          <a:pPr marL="114300" lvl="1" indent="-114300" algn="l" defTabSz="666750">
+          <a:pPr marL="342900" lvl="2" indent="-171450" algn="l" defTabSz="800100">
             <a:lnSpc>
               <a:spcPct val="90000"/>
             </a:lnSpc>
@@ -6484,12 +6148,12 @@
             <a:buChar char="•"/>
           </a:pPr>
           <a:r>
-            <a:rPr lang="it-IT" sz="1500" b="1" kern="1200" dirty="0"/>
-            <a:t>Active Record ORM</a:t>
+            <a:rPr lang="it-IT" sz="1800" kern="1200" dirty="0"/>
+            <a:t>Gestisce la persistenza di tutti i dati: aziende, conversazioni, toni, rating.</a:t>
           </a:r>
         </a:p>
         <a:p>
-          <a:pPr marL="228600" lvl="2" indent="-114300" algn="l" defTabSz="666750">
+          <a:pPr marL="171450" lvl="1" indent="-171450" algn="l" defTabSz="800100">
             <a:lnSpc>
               <a:spcPct val="90000"/>
             </a:lnSpc>
@@ -6500,16 +6164,12 @@
               <a:spcPct val="15000"/>
             </a:spcAft>
             <a:buFont typeface="Arial" panose="020B0604020202020204" pitchFamily="34" charset="0"/>
-            <a:buChar char="–"/>
+            <a:buNone/>
           </a:pPr>
-          <a:r>
-            <a:rPr lang="en-US" sz="1500" kern="1200"/>
-            <a:t>Relazioni: Company has_many Documents, Conversations, Tones</a:t>
-          </a:r>
-          <a:endParaRPr lang="it-IT" sz="1500" kern="1200"/>
+          <a:endParaRPr lang="it-IT" sz="1800" kern="1200" dirty="0"/>
         </a:p>
         <a:p>
-          <a:pPr marL="228600" lvl="2" indent="-114300" algn="l" defTabSz="666750">
+          <a:pPr marL="171450" lvl="1" indent="-171450" algn="l" defTabSz="800100">
             <a:lnSpc>
               <a:spcPct val="90000"/>
             </a:lnSpc>
@@ -6520,16 +6180,20 @@
               <a:spcPct val="15000"/>
             </a:spcAft>
             <a:buFont typeface="Arial" panose="020B0604020202020204" pitchFamily="34" charset="0"/>
-            <a:buChar char="–"/>
+            <a:buChar char="•"/>
           </a:pPr>
           <a:r>
-            <a:rPr lang="en-US" sz="1500" kern="1200"/>
-            <a:t>Validazioni, enum per status, callbacks lifecycle</a:t>
+            <a:rPr lang="it-IT" sz="1800" b="1" kern="1200" dirty="0"/>
+            <a:t>Integrazione con </a:t>
           </a:r>
-          <a:endParaRPr lang="it-IT" sz="1500" kern="1200"/>
+          <a:r>
+            <a:rPr lang="it-IT" sz="1800" b="1" kern="1200" dirty="0" err="1"/>
+            <a:t>Rails</a:t>
+          </a:r>
+          <a:endParaRPr lang="it-IT" sz="1800" b="1" kern="1200" dirty="0"/>
         </a:p>
         <a:p>
-          <a:pPr marL="228600" lvl="2" indent="-114300" algn="l" defTabSz="666750">
+          <a:pPr marL="342900" lvl="2" indent="-171450" algn="l" defTabSz="800100">
             <a:lnSpc>
               <a:spcPct val="90000"/>
             </a:lnSpc>
@@ -6540,38 +6204,60 @@
               <a:spcPct val="15000"/>
             </a:spcAft>
             <a:buFont typeface="Arial" panose="020B0604020202020204" pitchFamily="34" charset="0"/>
-            <a:buChar char="–"/>
+            <a:buChar char="•"/>
           </a:pPr>
           <a:r>
-            <a:rPr lang="it-IT" sz="1500" kern="1200" dirty="0"/>
-            <a:t>JSON </a:t>
+            <a:rPr lang="it-IT" sz="1800" b="0" kern="1200" dirty="0"/>
+            <a:t>Supporto nativo e totale, gestito tramite </a:t>
           </a:r>
           <a:r>
-            <a:rPr lang="it-IT" sz="1500" kern="1200" dirty="0" err="1"/>
-            <a:t>column</a:t>
+            <a:rPr lang="it-IT" sz="1800" b="0" kern="1200" dirty="0" err="1"/>
+            <a:t>active</a:t>
           </a:r>
           <a:r>
-            <a:rPr lang="it-IT" sz="1500" kern="1200" dirty="0"/>
-            <a:t> (</a:t>
+            <a:rPr lang="it-IT" sz="1800" b="0" kern="1200" dirty="0"/>
+            <a:t> record.</a:t>
+          </a:r>
+        </a:p>
+        <a:p>
+          <a:pPr marL="342900" lvl="2" indent="-171450" algn="l" defTabSz="800100">
+            <a:lnSpc>
+              <a:spcPct val="90000"/>
+            </a:lnSpc>
+            <a:spcBef>
+              <a:spcPct val="0"/>
+            </a:spcBef>
+            <a:spcAft>
+              <a:spcPct val="15000"/>
+            </a:spcAft>
+            <a:buFont typeface="Arial" panose="020B0604020202020204" pitchFamily="34" charset="0"/>
+            <a:buChar char="•"/>
+          </a:pPr>
+          <a:r>
+            <a:rPr lang="it-IT" sz="1800" b="0" kern="1200" dirty="0"/>
+            <a:t>Separazione ambienti: test, </a:t>
           </a:r>
           <a:r>
-            <a:rPr lang="it-IT" sz="1500" kern="1200" dirty="0" err="1"/>
-            <a:t>ai_data</a:t>
+            <a:rPr lang="it-IT" sz="1800" b="0" kern="1200" dirty="0" err="1"/>
+            <a:t>dev</a:t>
           </a:r>
           <a:r>
-            <a:rPr lang="it-IT" sz="1500" kern="1200" dirty="0"/>
-            <a:t>) per salvare dati estratti da </a:t>
+            <a:rPr lang="it-IT" sz="1800" b="0" kern="1200" dirty="0"/>
+            <a:t> e </a:t>
           </a:r>
           <a:r>
-            <a:rPr lang="it-IT" sz="1500" kern="1200" dirty="0" err="1"/>
-            <a:t>Bedrock</a:t>
+            <a:rPr lang="it-IT" sz="1800" b="0" kern="1200" dirty="0" err="1"/>
+            <a:t>prod</a:t>
           </a:r>
-          <a:endParaRPr lang="it-IT" sz="1500" kern="1200" dirty="0"/>
+          <a:r>
+            <a:rPr lang="it-IT" sz="1800" b="0" kern="1200" dirty="0"/>
+            <a:t>.</a:t>
+          </a:r>
         </a:p>
       </dsp:txBody>
       <dsp:txXfrm>
-        <a:off x="0" y="603912"/>
-        <a:ext cx="4698998" cy="3874500"/>
+        <a:off x="0" y="1039962"/>
+        <a:ext cx="4698998" cy="3150000"/>
       </dsp:txXfrm>
     </dsp:sp>
     <dsp:sp modelId="{EF67F11A-FCD0-4E59-A23F-17BCC3FB1182}">
@@ -6581,8 +6267,8 @@
       </dsp:nvSpPr>
       <dsp:spPr>
         <a:xfrm>
-          <a:off x="234949" y="382512"/>
-          <a:ext cx="3289298" cy="442800"/>
+          <a:off x="234949" y="670962"/>
+          <a:ext cx="3289298" cy="738000"/>
         </a:xfrm>
         <a:prstGeom prst="roundRect">
           <a:avLst/>
@@ -6653,7 +6339,7 @@
         </a:bodyPr>
         <a:lstStyle/>
         <a:p>
-          <a:pPr marL="0" lvl="0" indent="0" algn="l" defTabSz="666750">
+          <a:pPr marL="0" lvl="0" indent="0" algn="l" defTabSz="1111250">
             <a:lnSpc>
               <a:spcPct val="90000"/>
             </a:lnSpc>
@@ -6666,19 +6352,19 @@
             <a:buNone/>
           </a:pPr>
           <a:r>
-            <a:rPr lang="it-IT" sz="1500" b="1" kern="1200" dirty="0"/>
+            <a:rPr lang="it-IT" sz="2500" b="1" kern="1200" dirty="0"/>
             <a:t>Database - </a:t>
           </a:r>
           <a:r>
-            <a:rPr lang="it-IT" sz="1500" b="1" kern="1200" dirty="0" err="1"/>
+            <a:rPr lang="it-IT" sz="2500" b="1" kern="1200" dirty="0" err="1"/>
             <a:t>PostgreSQL</a:t>
           </a:r>
-          <a:endParaRPr lang="en-US" sz="1500" kern="1200" dirty="0"/>
+          <a:endParaRPr lang="en-US" sz="2500" kern="1200" dirty="0"/>
         </a:p>
       </dsp:txBody>
       <dsp:txXfrm>
-        <a:off x="256565" y="404128"/>
-        <a:ext cx="3246066" cy="399568"/>
+        <a:off x="270975" y="706988"/>
+        <a:ext cx="3217246" cy="665948"/>
       </dsp:txXfrm>
     </dsp:sp>
   </dsp:spTree>
@@ -6700,8 +6386,8 @@
       </dsp:nvSpPr>
       <dsp:spPr>
         <a:xfrm>
-          <a:off x="0" y="399031"/>
-          <a:ext cx="4698999" cy="4145400"/>
+          <a:off x="0" y="718200"/>
+          <a:ext cx="5364922" cy="5682600"/>
         </a:xfrm>
         <a:prstGeom prst="rect">
           <a:avLst/>
@@ -6737,12 +6423,12 @@
         <a:fontRef idx="minor"/>
       </dsp:style>
       <dsp:txBody>
-        <a:bodyPr spcFirstLastPara="0" vert="horz" wrap="square" lIns="364695" tIns="291592" rIns="364695" bIns="99568" numCol="1" spcCol="1270" anchor="t" anchorCtr="0">
+        <a:bodyPr spcFirstLastPara="0" vert="horz" wrap="square" lIns="416378" tIns="853948" rIns="416378" bIns="128016" numCol="1" spcCol="1270" anchor="t" anchorCtr="0">
           <a:noAutofit/>
         </a:bodyPr>
         <a:lstStyle/>
         <a:p>
-          <a:pPr marL="114300" lvl="1" indent="-114300" algn="l" defTabSz="622300">
+          <a:pPr marL="171450" lvl="1" indent="-171450" algn="l" defTabSz="800100">
             <a:lnSpc>
               <a:spcPct val="90000"/>
             </a:lnSpc>
@@ -6755,13 +6441,13 @@
             <a:buChar char="•"/>
           </a:pPr>
           <a:r>
-            <a:rPr lang="it-IT" sz="1400" kern="1200" dirty="0"/>
-            <a:t>Modello Amazon Nova Lite v1 per generazione testo e OCR</a:t>
+            <a:rPr lang="it-IT" sz="1800" kern="1200" dirty="0"/>
+            <a:t>Modello Amazon Nova Lite v1 per generazione testo e Nova Canvas per generazioni immagini.</a:t>
           </a:r>
-          <a:endParaRPr lang="en-US" sz="1400" kern="1200" dirty="0"/>
+          <a:endParaRPr lang="en-US" sz="1800" kern="1200" dirty="0"/>
         </a:p>
         <a:p>
-          <a:pPr marL="114300" lvl="1" indent="-114300" algn="l" defTabSz="622300">
+          <a:pPr marL="171450" lvl="1" indent="-171450" algn="l" defTabSz="800100">
             <a:lnSpc>
               <a:spcPct val="90000"/>
             </a:lnSpc>
@@ -6771,12 +6457,12 @@
             <a:spcAft>
               <a:spcPct val="15000"/>
             </a:spcAft>
-            <a:buNone/>
+            <a:buChar char="•"/>
           </a:pPr>
-          <a:endParaRPr lang="en-US" sz="1400" kern="1200" dirty="0"/>
+          <a:endParaRPr lang="en-US" sz="1800" kern="1200" dirty="0"/>
         </a:p>
         <a:p>
-          <a:pPr marL="114300" lvl="1" indent="-114300" algn="l" defTabSz="622300">
+          <a:pPr marL="171450" lvl="1" indent="-171450" algn="l" defTabSz="800100">
             <a:lnSpc>
               <a:spcPct val="90000"/>
             </a:lnSpc>
@@ -6789,105 +6475,13 @@
             <a:buNone/>
           </a:pPr>
           <a:r>
-            <a:rPr lang="it-IT" sz="1400" b="1" kern="1200" dirty="0"/>
+            <a:rPr lang="it-IT" sz="1800" b="1" kern="1200" dirty="0"/>
             <a:t>• AI Assistant Generativo</a:t>
           </a:r>
-          <a:endParaRPr lang="en-US" sz="1400" kern="1200" dirty="0"/>
+          <a:endParaRPr lang="en-US" sz="1800" kern="1200" dirty="0"/>
         </a:p>
         <a:p>
-          <a:pPr marL="228600" lvl="2" indent="-114300" algn="l" defTabSz="622300">
-            <a:lnSpc>
-              <a:spcPct val="90000"/>
-            </a:lnSpc>
-            <a:spcBef>
-              <a:spcPct val="0"/>
-            </a:spcBef>
-            <a:spcAft>
-              <a:spcPct val="15000"/>
-            </a:spcAft>
-            <a:buFont typeface="Arial" panose="020B0604020202020204" pitchFamily="34" charset="0"/>
-            <a:buChar char="–"/>
-          </a:pPr>
-          <a:r>
-            <a:rPr lang="it-IT" sz="1400" kern="1200"/>
-            <a:t>Converse API per generazione testo conversazionale</a:t>
-          </a:r>
-        </a:p>
-        <a:p>
-          <a:pPr marL="228600" lvl="2" indent="-114300" algn="l" defTabSz="622300">
-            <a:lnSpc>
-              <a:spcPct val="90000"/>
-            </a:lnSpc>
-            <a:spcBef>
-              <a:spcPct val="0"/>
-            </a:spcBef>
-            <a:spcAft>
-              <a:spcPct val="15000"/>
-            </a:spcAft>
-            <a:buFont typeface="Arial" panose="020B0604020202020204" pitchFamily="34" charset="0"/>
-            <a:buChar char="–"/>
-          </a:pPr>
-          <a:r>
-            <a:rPr lang="it-IT" sz="1400" kern="1200" dirty="0"/>
-            <a:t>System prompt personalizzato con descrizione azienda e tono</a:t>
-          </a:r>
-        </a:p>
-        <a:p>
-          <a:pPr marL="228600" lvl="2" indent="-114300" algn="l" defTabSz="622300">
-            <a:lnSpc>
-              <a:spcPct val="90000"/>
-            </a:lnSpc>
-            <a:spcBef>
-              <a:spcPct val="0"/>
-            </a:spcBef>
-            <a:spcAft>
-              <a:spcPct val="15000"/>
-            </a:spcAft>
-            <a:buFont typeface="Arial" panose="020B0604020202020204" pitchFamily="34" charset="0"/>
-            <a:buChar char="–"/>
-          </a:pPr>
-          <a:r>
-            <a:rPr lang="it-IT" sz="1400" kern="1200"/>
-            <a:t>Mantenimento contesto conversazione multi-turn</a:t>
-          </a:r>
-        </a:p>
-        <a:p>
-          <a:pPr marL="228600" lvl="2" indent="-114300" algn="l" defTabSz="622300">
-            <a:lnSpc>
-              <a:spcPct val="90000"/>
-            </a:lnSpc>
-            <a:spcBef>
-              <a:spcPct val="0"/>
-            </a:spcBef>
-            <a:spcAft>
-              <a:spcPct val="15000"/>
-            </a:spcAft>
-            <a:buFont typeface="Arial" panose="020B0604020202020204" pitchFamily="34" charset="0"/>
-            <a:buChar char="–"/>
-          </a:pPr>
-          <a:r>
-            <a:rPr lang="it-IT" sz="1400" kern="1200" dirty="0"/>
-            <a:t>Generazione comunicazioni interne</a:t>
-          </a:r>
-        </a:p>
-        <a:p>
-          <a:pPr marL="114300" lvl="1" indent="-114300" algn="l" defTabSz="622300">
-            <a:lnSpc>
-              <a:spcPct val="90000"/>
-            </a:lnSpc>
-            <a:spcBef>
-              <a:spcPct val="0"/>
-            </a:spcBef>
-            <a:spcAft>
-              <a:spcPct val="15000"/>
-            </a:spcAft>
-            <a:buFont typeface="Arial" panose="020B0604020202020204" pitchFamily="34" charset="0"/>
-            <a:buNone/>
-          </a:pPr>
-          <a:endParaRPr lang="it-IT" sz="1400" kern="1200" dirty="0"/>
-        </a:p>
-        <a:p>
-          <a:pPr marL="114300" lvl="1" indent="-114300" algn="l" defTabSz="622300">
+          <a:pPr marL="342900" lvl="2" indent="-171450" algn="l" defTabSz="800100">
             <a:lnSpc>
               <a:spcPct val="90000"/>
             </a:lnSpc>
@@ -6901,20 +6495,12 @@
             <a:buChar char="•"/>
           </a:pPr>
           <a:r>
-            <a:rPr lang="it-IT" sz="1400" b="1" kern="1200" dirty="0"/>
-            <a:t>AI Co-Pilot </a:t>
-          </a:r>
-          <a:r>
-            <a:rPr lang="it-IT" sz="1400" b="1" kern="1200" dirty="0" err="1"/>
-            <a:t>Document</a:t>
-          </a:r>
-          <a:r>
-            <a:rPr lang="it-IT" sz="1400" b="1" kern="1200" dirty="0"/>
-            <a:t> Analysis</a:t>
+            <a:rPr lang="it-IT" sz="1800" kern="1200" dirty="0"/>
+            <a:t>System prompt personalizzato con descrizione azienda e tono.</a:t>
           </a:r>
         </a:p>
         <a:p>
-          <a:pPr marL="228600" lvl="2" indent="-114300" algn="l" defTabSz="622300">
+          <a:pPr marL="342900" lvl="2" indent="-171450" algn="l" defTabSz="800100">
             <a:lnSpc>
               <a:spcPct val="90000"/>
             </a:lnSpc>
@@ -6925,15 +6511,15 @@
               <a:spcPct val="15000"/>
             </a:spcAft>
             <a:buFont typeface="Arial" panose="020B0604020202020204" pitchFamily="34" charset="0"/>
-            <a:buChar char="–"/>
+            <a:buChar char="•"/>
           </a:pPr>
           <a:r>
-            <a:rPr lang="it-IT" sz="1400" kern="1200"/>
-            <a:t>OCR e analisi documenti (PDF, PNG, JPEG)</a:t>
+            <a:rPr lang="it-IT" sz="1800" kern="1200" dirty="0"/>
+            <a:t>Facilità nel cambiare modello usando API-converse.</a:t>
           </a:r>
         </a:p>
         <a:p>
-          <a:pPr marL="228600" lvl="2" indent="-114300" algn="l" defTabSz="622300">
+          <a:pPr marL="342900" lvl="2" indent="-171450" algn="l" defTabSz="800100">
             <a:lnSpc>
               <a:spcPct val="90000"/>
             </a:lnSpc>
@@ -6944,15 +6530,15 @@
               <a:spcPct val="15000"/>
             </a:spcAft>
             <a:buFont typeface="Arial" panose="020B0604020202020204" pitchFamily="34" charset="0"/>
-            <a:buChar char="–"/>
+            <a:buChar char="•"/>
           </a:pPr>
           <a:r>
-            <a:rPr lang="it-IT" sz="1400" kern="1200"/>
-            <a:t>Estrazione dati strutturati: tipo documento, dipendente, importo, date</a:t>
+            <a:rPr lang="it-IT" sz="1800" kern="1200" dirty="0"/>
+            <a:t>Mantenimento contesto conversazione.</a:t>
           </a:r>
         </a:p>
         <a:p>
-          <a:pPr marL="228600" lvl="2" indent="-114300" algn="l" defTabSz="622300">
+          <a:pPr marL="342900" lvl="2" indent="-171450" algn="l" defTabSz="800100">
             <a:lnSpc>
               <a:spcPct val="90000"/>
             </a:lnSpc>
@@ -6963,17 +6549,109 @@
               <a:spcPct val="15000"/>
             </a:spcAft>
             <a:buFont typeface="Arial" panose="020B0604020202020204" pitchFamily="34" charset="0"/>
-            <a:buChar char="–"/>
+            <a:buChar char="•"/>
           </a:pPr>
           <a:r>
-            <a:rPr lang="it-IT" sz="1400" kern="1200" dirty="0"/>
-            <a:t>Output JSON validato per split e dispaccio automatico</a:t>
+            <a:rPr lang="it-IT" sz="1800" kern="1200" dirty="0"/>
+            <a:t>Generazione comunicazioni interne di immagini e testo.</a:t>
+          </a:r>
+        </a:p>
+        <a:p>
+          <a:pPr marL="171450" lvl="1" indent="-171450" algn="l" defTabSz="800100">
+            <a:lnSpc>
+              <a:spcPct val="90000"/>
+            </a:lnSpc>
+            <a:spcBef>
+              <a:spcPct val="0"/>
+            </a:spcBef>
+            <a:spcAft>
+              <a:spcPct val="15000"/>
+            </a:spcAft>
+            <a:buFont typeface="Arial" panose="020B0604020202020204" pitchFamily="34" charset="0"/>
+            <a:buChar char="•"/>
+          </a:pPr>
+          <a:r>
+            <a:rPr lang="it-IT" sz="1800" b="1" kern="1200" dirty="0"/>
+            <a:t>AI Co-Pilot </a:t>
+          </a:r>
+          <a:r>
+            <a:rPr lang="it-IT" sz="1800" b="1" kern="1200" dirty="0" err="1"/>
+            <a:t>Document</a:t>
+          </a:r>
+          <a:r>
+            <a:rPr lang="it-IT" sz="1800" b="1" kern="1200" dirty="0"/>
+            <a:t> Analysis</a:t>
+          </a:r>
+        </a:p>
+        <a:p>
+          <a:pPr marL="342900" lvl="2" indent="-171450" algn="l" defTabSz="800100">
+            <a:lnSpc>
+              <a:spcPct val="90000"/>
+            </a:lnSpc>
+            <a:spcBef>
+              <a:spcPct val="0"/>
+            </a:spcBef>
+            <a:spcAft>
+              <a:spcPct val="15000"/>
+            </a:spcAft>
+            <a:buFont typeface="Arial" panose="020B0604020202020204" pitchFamily="34" charset="0"/>
+            <a:buChar char="•"/>
+          </a:pPr>
+          <a:r>
+            <a:rPr lang="it-IT" sz="1800" kern="1200" dirty="0"/>
+            <a:t>OCR e analisi documenti (PDF, PNG, JPEG).</a:t>
+          </a:r>
+        </a:p>
+        <a:p>
+          <a:pPr marL="342900" lvl="2" indent="-171450" algn="l" defTabSz="800100">
+            <a:lnSpc>
+              <a:spcPct val="90000"/>
+            </a:lnSpc>
+            <a:spcBef>
+              <a:spcPct val="0"/>
+            </a:spcBef>
+            <a:spcAft>
+              <a:spcPct val="15000"/>
+            </a:spcAft>
+            <a:buFont typeface="Arial" panose="020B0604020202020204" pitchFamily="34" charset="0"/>
+            <a:buChar char="•"/>
+          </a:pPr>
+          <a:r>
+            <a:rPr lang="it-IT" sz="1800" kern="1200" dirty="0"/>
+            <a:t>Estrazione dati strutturati: tipo documento, dipendente, importo, date.</a:t>
+          </a:r>
+        </a:p>
+        <a:p>
+          <a:pPr marL="342900" lvl="2" indent="-171450" algn="l" defTabSz="800100">
+            <a:lnSpc>
+              <a:spcPct val="90000"/>
+            </a:lnSpc>
+            <a:spcBef>
+              <a:spcPct val="0"/>
+            </a:spcBef>
+            <a:spcAft>
+              <a:spcPct val="15000"/>
+            </a:spcAft>
+            <a:buFont typeface="Arial" panose="020B0604020202020204" pitchFamily="34" charset="0"/>
+            <a:buChar char="•"/>
+          </a:pPr>
+          <a:r>
+            <a:rPr lang="it-IT" sz="1800" kern="1200" dirty="0"/>
+            <a:t>Output JSON validato per split e </a:t>
+          </a:r>
+          <a:r>
+            <a:rPr lang="it-IT" sz="1800" kern="1200" dirty="0" err="1"/>
+            <a:t>dispatch</a:t>
+          </a:r>
+          <a:r>
+            <a:rPr lang="it-IT" sz="1800" kern="1200" dirty="0"/>
+            <a:t> automatico.</a:t>
           </a:r>
         </a:p>
       </dsp:txBody>
       <dsp:txXfrm>
-        <a:off x="0" y="399031"/>
-        <a:ext cx="4698999" cy="4145400"/>
+        <a:off x="0" y="718200"/>
+        <a:ext cx="5364922" cy="5682600"/>
       </dsp:txXfrm>
     </dsp:sp>
     <dsp:sp modelId="{EF67F11A-FCD0-4E59-A23F-17BCC3FB1182}">
@@ -6983,8 +6661,8 @@
       </dsp:nvSpPr>
       <dsp:spPr>
         <a:xfrm>
-          <a:off x="234949" y="137699"/>
-          <a:ext cx="3289299" cy="413280"/>
+          <a:off x="266038" y="0"/>
+          <a:ext cx="3755445" cy="1210320"/>
         </a:xfrm>
         <a:prstGeom prst="roundRect">
           <a:avLst/>
@@ -7050,12 +6728,12 @@
         </a:fontRef>
       </dsp:style>
       <dsp:txBody>
-        <a:bodyPr spcFirstLastPara="0" vert="horz" wrap="square" lIns="124328" tIns="0" rIns="124328" bIns="0" numCol="1" spcCol="1270" anchor="ctr" anchorCtr="0">
+        <a:bodyPr spcFirstLastPara="0" vert="horz" wrap="square" lIns="141947" tIns="0" rIns="141947" bIns="0" numCol="1" spcCol="1270" anchor="ctr" anchorCtr="0">
           <a:noAutofit/>
         </a:bodyPr>
         <a:lstStyle/>
         <a:p>
-          <a:pPr marL="0" lvl="0" indent="0" algn="l" defTabSz="622300">
+          <a:pPr marL="0" lvl="0" indent="0" algn="l" defTabSz="1244600">
             <a:lnSpc>
               <a:spcPct val="90000"/>
             </a:lnSpc>
@@ -7068,19 +6746,19 @@
             <a:buNone/>
           </a:pPr>
           <a:r>
-            <a:rPr lang="it-IT" sz="1400" b="1" kern="1200" dirty="0"/>
+            <a:rPr lang="it-IT" sz="2800" b="1" kern="1200" dirty="0"/>
             <a:t>AWS </a:t>
           </a:r>
           <a:r>
-            <a:rPr lang="it-IT" sz="1400" b="1" kern="1200" dirty="0" err="1"/>
+            <a:rPr lang="it-IT" sz="2800" b="1" kern="1200" dirty="0" err="1"/>
             <a:t>Bedrock</a:t>
           </a:r>
-          <a:endParaRPr lang="en-US" sz="1400" kern="1200" dirty="0"/>
+          <a:endParaRPr lang="en-US" sz="2800" kern="1200" dirty="0"/>
         </a:p>
       </dsp:txBody>
       <dsp:txXfrm>
-        <a:off x="255124" y="157874"/>
-        <a:ext cx="3248949" cy="372930"/>
+        <a:off x="325121" y="59083"/>
+        <a:ext cx="3637279" cy="1092154"/>
       </dsp:txXfrm>
     </dsp:sp>
   </dsp:spTree>
@@ -16639,7 +16317,7 @@
         </p:nvSpPr>
         <p:spPr>
           <a:xfrm>
-            <a:off x="16306800" y="9639300"/>
+            <a:off x="16002000" y="9563100"/>
             <a:ext cx="2895600" cy="365125"/>
           </a:xfrm>
         </p:spPr>
@@ -16655,6 +16333,19 @@
               </a:rPr>
               <a:t>1</a:t>
             </a:r>
+            <a:r>
+              <a:rPr lang="it-IT" sz="8000" dirty="0">
+                <a:solidFill>
+                  <a:schemeClr val="tx1"/>
+                </a:solidFill>
+              </a:rPr>
+              <a:t>/3</a:t>
+            </a:r>
+            <a:endParaRPr lang="en-US" sz="8000" dirty="0">
+              <a:solidFill>
+                <a:schemeClr val="tx1"/>
+              </a:solidFill>
+            </a:endParaRPr>
           </a:p>
         </p:txBody>
       </p:sp>
@@ -16834,7 +16525,7 @@
         </p:nvSpPr>
         <p:spPr>
           <a:xfrm>
-            <a:off x="16306800" y="9639300"/>
+            <a:off x="16002000" y="9563100"/>
             <a:ext cx="2895600" cy="365125"/>
           </a:xfrm>
         </p:spPr>
@@ -16848,7 +16539,7 @@
                   <a:schemeClr val="tx1"/>
                 </a:solidFill>
               </a:rPr>
-              <a:t>2</a:t>
+              <a:t>2/3</a:t>
             </a:r>
           </a:p>
         </p:txBody>
@@ -17030,13 +16721,13 @@
           <p:nvPr>
             <p:extLst>
               <p:ext uri="{D42A27DB-BD31-4B8C-83A1-F6EECF244321}">
-                <p14:modId xmlns:p14="http://schemas.microsoft.com/office/powerpoint/2010/main" val="2265556566"/>
+                <p14:modId xmlns:p14="http://schemas.microsoft.com/office/powerpoint/2010/main" val="1369799902"/>
               </p:ext>
             </p:extLst>
           </p:nvPr>
         </p:nvGraphicFramePr>
         <p:xfrm>
-          <a:off x="9017002" y="5143500"/>
+          <a:off x="2667000" y="5067300"/>
           <a:ext cx="4698998" cy="4860925"/>
         </p:xfrm>
         <a:graphic>
@@ -17072,7 +16763,7 @@
         </p:blipFill>
         <p:spPr>
           <a:xfrm>
-            <a:off x="2819399" y="6476999"/>
+            <a:off x="9394133" y="6896100"/>
             <a:ext cx="4648199" cy="2133600"/>
           </a:xfrm>
           <a:prstGeom prst="rect">
@@ -17098,7 +16789,7 @@
         </p:nvSpPr>
         <p:spPr>
           <a:xfrm>
-            <a:off x="16306800" y="9639300"/>
+            <a:off x="16002000" y="9563100"/>
             <a:ext cx="2895600" cy="365125"/>
           </a:xfrm>
         </p:spPr>
@@ -17112,7 +16803,7 @@
                   <a:schemeClr val="tx1"/>
                 </a:solidFill>
               </a:rPr>
-              <a:t>3</a:t>
+              <a:t>3/3</a:t>
             </a:r>
           </a:p>
         </p:txBody>
@@ -17161,14 +16852,14 @@
           <p:nvPr>
             <p:extLst>
               <p:ext uri="{D42A27DB-BD31-4B8C-83A1-F6EECF244321}">
-                <p14:modId xmlns:p14="http://schemas.microsoft.com/office/powerpoint/2010/main" val="1626629464"/>
+                <p14:modId xmlns:p14="http://schemas.microsoft.com/office/powerpoint/2010/main" val="2962760131"/>
               </p:ext>
             </p:extLst>
           </p:nvPr>
         </p:nvGraphicFramePr>
         <p:xfrm>
-          <a:off x="9017002" y="348445"/>
-          <a:ext cx="4698999" cy="4627440"/>
+          <a:off x="9113078" y="190500"/>
+          <a:ext cx="5364922" cy="6400800"/>
         </p:xfrm>
         <a:graphic>
           <a:graphicData uri="http://schemas.openxmlformats.org/drawingml/2006/diagram">
@@ -17203,7 +16894,7 @@
         </p:blipFill>
         <p:spPr>
           <a:xfrm>
-            <a:off x="2368681" y="1485900"/>
+            <a:off x="2368681" y="1506608"/>
             <a:ext cx="5079999" cy="2667000"/>
           </a:xfrm>
           <a:prstGeom prst="rect">

</xml_diff>

<commit_message>
modificato un ultima volta il pdf tecnologie
</commit_message>
<xml_diff>
--- a/RTB/TECNOLOGIE/Tecnologie.pptx
+++ b/RTB/TECNOLOGIE/Tecnologie.pptx
@@ -3472,65 +3472,6 @@
         </a:p>
       </dgm:t>
     </dgm:pt>
-    <dgm:pt modelId="{3850311C-A53C-4052-BDD5-F5866951D844}">
-      <dgm:prSet custT="1"/>
-      <dgm:spPr>
-        <a:solidFill>
-          <a:srgbClr val="FFFAEF">
-            <a:alpha val="90000"/>
-          </a:srgbClr>
-        </a:solidFill>
-      </dgm:spPr>
-      <dgm:t>
-        <a:bodyPr/>
-        <a:lstStyle/>
-        <a:p>
-          <a:pPr>
-            <a:buFont typeface="Arial" panose="020B0604020202020204" pitchFamily="34" charset="0"/>
-            <a:buChar char="•"/>
-          </a:pPr>
-          <a:r>
-            <a:rPr lang="it-IT" sz="2200" b="1" dirty="0" err="1"/>
-            <a:t>Angular</a:t>
-          </a:r>
-          <a:r>
-            <a:rPr lang="it-IT" sz="2200" b="1" dirty="0"/>
-            <a:t> (v21) in </a:t>
-          </a:r>
-          <a:r>
-            <a:rPr lang="it-IT" sz="2200" b="1" dirty="0" err="1"/>
-            <a:t>TypeScript</a:t>
-          </a:r>
-          <a:r>
-            <a:rPr lang="it-IT" sz="2200" b="1" dirty="0"/>
-            <a:t> su ambiente Node.js v24</a:t>
-          </a:r>
-          <a:endParaRPr lang="en-US" sz="2200" dirty="0"/>
-        </a:p>
-      </dgm:t>
-    </dgm:pt>
-    <dgm:pt modelId="{1093B51F-1E48-46C6-B64A-7D72D2D61ACC}" type="parTrans" cxnId="{27F0BE87-1F53-4513-854E-A9EF65EBF7FE}">
-      <dgm:prSet/>
-      <dgm:spPr/>
-      <dgm:t>
-        <a:bodyPr/>
-        <a:lstStyle/>
-        <a:p>
-          <a:endParaRPr lang="it-IT"/>
-        </a:p>
-      </dgm:t>
-    </dgm:pt>
-    <dgm:pt modelId="{B85F275C-6B08-4B47-A49E-6839949226DE}" type="sibTrans" cxnId="{27F0BE87-1F53-4513-854E-A9EF65EBF7FE}">
-      <dgm:prSet/>
-      <dgm:spPr/>
-      <dgm:t>
-        <a:bodyPr/>
-        <a:lstStyle/>
-        <a:p>
-          <a:endParaRPr lang="it-IT"/>
-        </a:p>
-      </dgm:t>
-    </dgm:pt>
     <dgm:pt modelId="{81C5FAF5-7969-428F-9168-FEA62E83FEE0}">
       <dgm:prSet custT="1"/>
       <dgm:spPr>
@@ -3753,6 +3694,208 @@
         </a:p>
       </dgm:t>
     </dgm:pt>
+    <dgm:pt modelId="{EE76E364-6A46-492A-9FD7-63C775ADA808}">
+      <dgm:prSet custT="1"/>
+      <dgm:spPr/>
+      <dgm:t>
+        <a:bodyPr/>
+        <a:lstStyle/>
+        <a:p>
+          <a:r>
+            <a:rPr lang="it-IT" sz="2200" b="1" dirty="0" err="1"/>
+            <a:t>Frontend</a:t>
+          </a:r>
+          <a:r>
+            <a:rPr lang="it-IT" sz="2200" b="1" dirty="0"/>
+            <a:t> - </a:t>
+          </a:r>
+          <a:r>
+            <a:rPr lang="it-IT" sz="2200" b="1" dirty="0" err="1"/>
+            <a:t>Angular</a:t>
+          </a:r>
+          <a:endParaRPr lang="en-US" sz="2200" dirty="0"/>
+        </a:p>
+      </dgm:t>
+    </dgm:pt>
+    <dgm:pt modelId="{119AEC78-9891-4081-85AD-AAE5114E48ED}" type="sibTrans" cxnId="{8ADAB9E6-BB3B-4581-9B45-07948A4AEA67}">
+      <dgm:prSet/>
+      <dgm:spPr/>
+      <dgm:t>
+        <a:bodyPr/>
+        <a:lstStyle/>
+        <a:p>
+          <a:endParaRPr lang="en-US"/>
+        </a:p>
+      </dgm:t>
+    </dgm:pt>
+    <dgm:pt modelId="{522B9AE2-1358-4DCB-B21B-51AD7A4CC3B6}" type="parTrans" cxnId="{8ADAB9E6-BB3B-4581-9B45-07948A4AEA67}">
+      <dgm:prSet/>
+      <dgm:spPr/>
+      <dgm:t>
+        <a:bodyPr/>
+        <a:lstStyle/>
+        <a:p>
+          <a:endParaRPr lang="en-US"/>
+        </a:p>
+      </dgm:t>
+    </dgm:pt>
+    <dgm:pt modelId="{E81EBE7F-1B29-4F3B-9D90-F27A5F52A4F7}">
+      <dgm:prSet custT="1"/>
+      <dgm:spPr>
+        <a:solidFill>
+          <a:srgbClr val="FFFAEF">
+            <a:alpha val="90000"/>
+          </a:srgbClr>
+        </a:solidFill>
+      </dgm:spPr>
+      <dgm:t>
+        <a:bodyPr/>
+        <a:lstStyle/>
+        <a:p>
+          <a:pPr>
+            <a:buFont typeface="Arial" panose="020B0604020202020204" pitchFamily="34" charset="0"/>
+            <a:buNone/>
+          </a:pPr>
+          <a:r>
+            <a:rPr lang="it-IT" sz="2200" b="1" dirty="0" err="1"/>
+            <a:t>Angular</a:t>
+          </a:r>
+          <a:r>
+            <a:rPr lang="it-IT" sz="2200" b="1" dirty="0"/>
+            <a:t> (v21) su ambiente Node.js v24</a:t>
+          </a:r>
+          <a:endParaRPr lang="en-US" sz="2200" dirty="0"/>
+        </a:p>
+      </dgm:t>
+    </dgm:pt>
+    <dgm:pt modelId="{901F6192-51CD-49F4-8A54-859AB828A347}" type="parTrans" cxnId="{8C265198-3772-4E2A-AD6C-ABEF95119153}">
+      <dgm:prSet/>
+      <dgm:spPr/>
+      <dgm:t>
+        <a:bodyPr/>
+        <a:lstStyle/>
+        <a:p>
+          <a:endParaRPr lang="it-IT"/>
+        </a:p>
+      </dgm:t>
+    </dgm:pt>
+    <dgm:pt modelId="{3D557813-893F-4AAA-9A58-5F46E98736F6}" type="sibTrans" cxnId="{8C265198-3772-4E2A-AD6C-ABEF95119153}">
+      <dgm:prSet/>
+      <dgm:spPr/>
+      <dgm:t>
+        <a:bodyPr/>
+        <a:lstStyle/>
+        <a:p>
+          <a:endParaRPr lang="it-IT"/>
+        </a:p>
+      </dgm:t>
+    </dgm:pt>
+    <dgm:pt modelId="{47035833-554B-4E51-989B-BBBA7CB2F1B2}">
+      <dgm:prSet custT="1"/>
+      <dgm:spPr>
+        <a:solidFill>
+          <a:srgbClr val="FFFAEF">
+            <a:alpha val="90000"/>
+          </a:srgbClr>
+        </a:solidFill>
+      </dgm:spPr>
+      <dgm:t>
+        <a:bodyPr/>
+        <a:lstStyle/>
+        <a:p>
+          <a:pPr>
+            <a:buFont typeface="Arial" panose="020B0604020202020204" pitchFamily="34" charset="0"/>
+            <a:buNone/>
+          </a:pPr>
+          <a:r>
+            <a:rPr lang="en-US" sz="2200" b="0" dirty="0" err="1"/>
+            <a:t>Scelta</a:t>
+          </a:r>
+          <a:r>
+            <a:rPr lang="en-US" sz="2200" b="0" dirty="0"/>
+            <a:t> di </a:t>
+          </a:r>
+          <a:r>
+            <a:rPr lang="en-US" sz="2200" b="1" dirty="0"/>
+            <a:t>Angular Vs React:</a:t>
+          </a:r>
+          <a:endParaRPr lang="en-US" sz="2200" dirty="0"/>
+        </a:p>
+      </dgm:t>
+    </dgm:pt>
+    <dgm:pt modelId="{90EBB25F-9B48-4B19-B9EE-674C6F7D6E33}" type="parTrans" cxnId="{C4653128-9530-4777-A348-542D422C2F4C}">
+      <dgm:prSet/>
+      <dgm:spPr/>
+      <dgm:t>
+        <a:bodyPr/>
+        <a:lstStyle/>
+        <a:p>
+          <a:endParaRPr lang="it-IT"/>
+        </a:p>
+      </dgm:t>
+    </dgm:pt>
+    <dgm:pt modelId="{D685D6C1-2BC9-402B-BD46-4FA2EE1F5CC1}" type="sibTrans" cxnId="{C4653128-9530-4777-A348-542D422C2F4C}">
+      <dgm:prSet/>
+      <dgm:spPr/>
+      <dgm:t>
+        <a:bodyPr/>
+        <a:lstStyle/>
+        <a:p>
+          <a:endParaRPr lang="it-IT"/>
+        </a:p>
+      </dgm:t>
+    </dgm:pt>
+    <dgm:pt modelId="{9D2878A0-3308-49D9-9E8B-BB7B16C5666C}">
+      <dgm:prSet custT="1"/>
+      <dgm:spPr>
+        <a:solidFill>
+          <a:srgbClr val="FFFAEF">
+            <a:alpha val="90000"/>
+          </a:srgbClr>
+        </a:solidFill>
+      </dgm:spPr>
+      <dgm:t>
+        <a:bodyPr/>
+        <a:lstStyle/>
+        <a:p>
+          <a:pPr>
+            <a:buFont typeface="Arial" panose="020B0604020202020204" pitchFamily="34" charset="0"/>
+            <a:buChar char="•"/>
+          </a:pPr>
+          <a:r>
+            <a:rPr lang="en-US" sz="2200" dirty="0"/>
+            <a:t>Framework vs </a:t>
+          </a:r>
+          <a:r>
+            <a:rPr lang="en-US" sz="2200" dirty="0" err="1"/>
+            <a:t>libreria</a:t>
+          </a:r>
+          <a:endParaRPr lang="en-US" sz="2200" dirty="0"/>
+        </a:p>
+      </dgm:t>
+    </dgm:pt>
+    <dgm:pt modelId="{2C603990-4AF4-4301-850D-F66262D359B2}" type="parTrans" cxnId="{AEF394F9-D7FB-464B-AFA5-C5B843046B96}">
+      <dgm:prSet/>
+      <dgm:spPr/>
+      <dgm:t>
+        <a:bodyPr/>
+        <a:lstStyle/>
+        <a:p>
+          <a:endParaRPr lang="it-IT"/>
+        </a:p>
+      </dgm:t>
+    </dgm:pt>
+    <dgm:pt modelId="{BDB38DF0-81C7-4A1C-BFE2-56278E86F3DB}" type="sibTrans" cxnId="{AEF394F9-D7FB-464B-AFA5-C5B843046B96}">
+      <dgm:prSet/>
+      <dgm:spPr/>
+      <dgm:t>
+        <a:bodyPr/>
+        <a:lstStyle/>
+        <a:p>
+          <a:endParaRPr lang="it-IT"/>
+        </a:p>
+      </dgm:t>
+    </dgm:pt>
     <dgm:pt modelId="{3ACFCC25-7784-4356-B8DF-A35CF2CC5237}">
       <dgm:prSet custT="1"/>
       <dgm:spPr>
@@ -3798,7 +3941,7 @@
         </a:p>
       </dgm:t>
     </dgm:pt>
-    <dgm:pt modelId="{1FFA7EC9-892D-4681-A9B1-5FE3969C5613}" type="parTrans" cxnId="{C62AC98E-E928-42FA-A277-7F38775C0B7E}">
+    <dgm:pt modelId="{1FFA7EC9-892D-4681-A9B1-5FE3969C5613}" type="parTrans" cxnId="{157AD865-39E9-4394-AD26-FA162D902D24}">
       <dgm:prSet/>
       <dgm:spPr/>
       <dgm:t>
@@ -3809,7 +3952,7 @@
         </a:p>
       </dgm:t>
     </dgm:pt>
-    <dgm:pt modelId="{423D80BF-E726-4A72-8017-67F8D9F24CD1}" type="sibTrans" cxnId="{C62AC98E-E928-42FA-A277-7F38775C0B7E}">
+    <dgm:pt modelId="{423D80BF-E726-4A72-8017-67F8D9F24CD1}" type="sibTrans" cxnId="{157AD865-39E9-4394-AD26-FA162D902D24}">
       <dgm:prSet/>
       <dgm:spPr/>
       <dgm:t>
@@ -3820,48 +3963,151 @@
         </a:p>
       </dgm:t>
     </dgm:pt>
-    <dgm:pt modelId="{EE76E364-6A46-492A-9FD7-63C775ADA808}">
+    <dgm:pt modelId="{3083C0AC-5FAE-4A98-AD65-B00E46317EAA}">
       <dgm:prSet custT="1"/>
-      <dgm:spPr/>
+      <dgm:spPr>
+        <a:solidFill>
+          <a:srgbClr val="FFFAEF">
+            <a:alpha val="90000"/>
+          </a:srgbClr>
+        </a:solidFill>
+      </dgm:spPr>
       <dgm:t>
         <a:bodyPr/>
         <a:lstStyle/>
         <a:p>
-          <a:r>
-            <a:rPr lang="it-IT" sz="2200" b="1" dirty="0" err="1"/>
-            <a:t>Frontend</a:t>
-          </a:r>
-          <a:r>
-            <a:rPr lang="it-IT" sz="2200" b="1" dirty="0"/>
-            <a:t> - </a:t>
-          </a:r>
-          <a:r>
-            <a:rPr lang="it-IT" sz="2200" b="1" dirty="0" err="1"/>
-            <a:t>Angular</a:t>
-          </a:r>
-          <a:endParaRPr lang="en-US" sz="2200" dirty="0"/>
+          <a:pPr>
+            <a:buFont typeface="Arial" panose="020B0604020202020204" pitchFamily="34" charset="0"/>
+            <a:buNone/>
+          </a:pPr>
+          <a:r>
+            <a:rPr lang="en-US" sz="2200" b="1" dirty="0"/>
+            <a:t>Angular </a:t>
+          </a:r>
+          <a:r>
+            <a:rPr lang="en-US" sz="2200" b="1" dirty="0" err="1"/>
+            <a:t>nel</a:t>
+          </a:r>
+          <a:r>
+            <a:rPr lang="en-US" sz="2200" b="1" dirty="0"/>
+            <a:t> nostro POC:</a:t>
+          </a:r>
         </a:p>
       </dgm:t>
     </dgm:pt>
-    <dgm:pt modelId="{119AEC78-9891-4081-85AD-AAE5114E48ED}" type="sibTrans" cxnId="{8ADAB9E6-BB3B-4581-9B45-07948A4AEA67}">
+    <dgm:pt modelId="{6D46ADC7-98F1-4B44-8ABD-9CF9E2656DEB}" type="parTrans" cxnId="{F7EA5785-3780-49CB-8439-3772D648A86E}">
       <dgm:prSet/>
       <dgm:spPr/>
       <dgm:t>
         <a:bodyPr/>
         <a:lstStyle/>
         <a:p>
-          <a:endParaRPr lang="en-US"/>
+          <a:endParaRPr lang="it-IT"/>
         </a:p>
       </dgm:t>
     </dgm:pt>
-    <dgm:pt modelId="{522B9AE2-1358-4DCB-B21B-51AD7A4CC3B6}" type="parTrans" cxnId="{8ADAB9E6-BB3B-4581-9B45-07948A4AEA67}">
+    <dgm:pt modelId="{24B2D5EA-2F1B-49BD-ACC9-DCDED6EDC43F}" type="sibTrans" cxnId="{F7EA5785-3780-49CB-8439-3772D648A86E}">
       <dgm:prSet/>
       <dgm:spPr/>
       <dgm:t>
         <a:bodyPr/>
         <a:lstStyle/>
         <a:p>
-          <a:endParaRPr lang="en-US"/>
+          <a:endParaRPr lang="it-IT"/>
+        </a:p>
+      </dgm:t>
+    </dgm:pt>
+    <dgm:pt modelId="{1E54DBF2-0B1C-465C-A75E-DD6A16A0630B}">
+      <dgm:prSet custT="1"/>
+      <dgm:spPr>
+        <a:solidFill>
+          <a:srgbClr val="FFFAEF">
+            <a:alpha val="90000"/>
+          </a:srgbClr>
+        </a:solidFill>
+      </dgm:spPr>
+      <dgm:t>
+        <a:bodyPr/>
+        <a:lstStyle/>
+        <a:p>
+          <a:pPr>
+            <a:buFont typeface="Arial" panose="020B0604020202020204" pitchFamily="34" charset="0"/>
+            <a:buChar char="•"/>
+          </a:pPr>
+          <a:r>
+            <a:rPr lang="en-US" sz="2200" dirty="0"/>
+            <a:t>OOP vs </a:t>
+          </a:r>
+          <a:r>
+            <a:rPr lang="en-US" sz="2200" dirty="0" err="1"/>
+            <a:t>funzionale</a:t>
+          </a:r>
+          <a:endParaRPr lang="en-US" sz="2200" dirty="0"/>
+        </a:p>
+      </dgm:t>
+    </dgm:pt>
+    <dgm:pt modelId="{E34D0822-23EB-47BC-B7A4-28DE0FA75F12}" type="parTrans" cxnId="{1746BAF4-7F83-4E61-BBA9-235227B536CB}">
+      <dgm:prSet/>
+      <dgm:spPr/>
+      <dgm:t>
+        <a:bodyPr/>
+        <a:lstStyle/>
+        <a:p>
+          <a:endParaRPr lang="it-IT"/>
+        </a:p>
+      </dgm:t>
+    </dgm:pt>
+    <dgm:pt modelId="{65F8CC45-709D-41D6-88A2-C7DB84C09C2B}" type="sibTrans" cxnId="{1746BAF4-7F83-4E61-BBA9-235227B536CB}">
+      <dgm:prSet/>
+      <dgm:spPr/>
+      <dgm:t>
+        <a:bodyPr/>
+        <a:lstStyle/>
+        <a:p>
+          <a:endParaRPr lang="it-IT"/>
+        </a:p>
+      </dgm:t>
+    </dgm:pt>
+    <dgm:pt modelId="{C07C55AE-257E-4178-8EDE-747334E3BDE5}">
+      <dgm:prSet custT="1"/>
+      <dgm:spPr>
+        <a:solidFill>
+          <a:srgbClr val="FFFAEF">
+            <a:alpha val="90000"/>
+          </a:srgbClr>
+        </a:solidFill>
+      </dgm:spPr>
+      <dgm:t>
+        <a:bodyPr/>
+        <a:lstStyle/>
+        <a:p>
+          <a:pPr>
+            <a:buFont typeface="Arial" panose="020B0604020202020204" pitchFamily="34" charset="0"/>
+            <a:buNone/>
+          </a:pPr>
+          <a:endParaRPr lang="en-US" sz="2200" dirty="0"/>
+        </a:p>
+      </dgm:t>
+    </dgm:pt>
+    <dgm:pt modelId="{57396DED-E5BD-47EF-A274-349AC9A0A616}" type="parTrans" cxnId="{AE67C9F9-2F25-47CF-A235-1DBDA1B04B18}">
+      <dgm:prSet/>
+      <dgm:spPr/>
+      <dgm:t>
+        <a:bodyPr/>
+        <a:lstStyle/>
+        <a:p>
+          <a:endParaRPr lang="it-IT"/>
+        </a:p>
+      </dgm:t>
+    </dgm:pt>
+    <dgm:pt modelId="{F966E27C-520B-4A2A-9EB2-BFF87F80813F}" type="sibTrans" cxnId="{AE67C9F9-2F25-47CF-A235-1DBDA1B04B18}">
+      <dgm:prSet/>
+      <dgm:spPr/>
+      <dgm:t>
+        <a:bodyPr/>
+        <a:lstStyle/>
+        <a:p>
+          <a:endParaRPr lang="it-IT"/>
         </a:p>
       </dgm:t>
     </dgm:pt>
@@ -3897,7 +4143,7 @@
       <dgm:spPr/>
     </dgm:pt>
     <dgm:pt modelId="{8A748C3E-CE62-4E92-A0FE-1F5548AC9D02}" type="pres">
-      <dgm:prSet presAssocID="{EE76E364-6A46-492A-9FD7-63C775ADA808}" presName="childText" presStyleLbl="conFgAcc1" presStyleIdx="0" presStyleCnt="1" custScaleY="105478" custLinFactNeighborX="3710" custLinFactNeighborY="-27338">
+      <dgm:prSet presAssocID="{EE76E364-6A46-492A-9FD7-63C775ADA808}" presName="childText" presStyleLbl="conFgAcc1" presStyleIdx="0" presStyleCnt="1" custScaleY="94239" custLinFactNeighborX="-3786" custLinFactNeighborY="-40692">
         <dgm:presLayoutVars>
           <dgm:bulletEnabled val="1"/>
         </dgm:presLayoutVars>
@@ -3906,33 +4152,43 @@
     </dgm:pt>
   </dgm:ptLst>
   <dgm:cxnLst>
-    <dgm:cxn modelId="{D95E0A08-3823-456F-B045-8B2D181525F8}" type="presOf" srcId="{BCA671DB-9D16-4302-B7A8-56BF6E3543A9}" destId="{8A748C3E-CE62-4E92-A0FE-1F5548AC9D02}" srcOrd="0" destOrd="2" presId="urn:microsoft.com/office/officeart/2005/8/layout/list1"/>
-    <dgm:cxn modelId="{E9092709-6E91-45E0-A7A5-3A0CB221696B}" type="presOf" srcId="{EE76E364-6A46-492A-9FD7-63C775ADA808}" destId="{0E75AC4A-956D-493C-A82B-572CF3B1603B}" srcOrd="0" destOrd="0" presId="urn:microsoft.com/office/officeart/2005/8/layout/list1"/>
-    <dgm:cxn modelId="{0A628414-F6B5-42E1-A8F3-0CB3833C4BF6}" type="presOf" srcId="{81C5FAF5-7969-428F-9168-FEA62E83FEE0}" destId="{8A748C3E-CE62-4E92-A0FE-1F5548AC9D02}" srcOrd="0" destOrd="4" presId="urn:microsoft.com/office/officeart/2005/8/layout/list1"/>
-    <dgm:cxn modelId="{248A3716-A158-479A-925B-4FBEDA81A7A4}" srcId="{EE76E364-6A46-492A-9FD7-63C775ADA808}" destId="{81C5FAF5-7969-428F-9168-FEA62E83FEE0}" srcOrd="4" destOrd="0" parTransId="{F85420F4-2BF4-48A2-BC52-21EE60C7088A}" sibTransId="{76ECC8FB-B797-4F4E-8993-577D9FE42A74}"/>
-    <dgm:cxn modelId="{13F49D19-F08F-4F3F-8DFA-171716C82016}" type="presOf" srcId="{F5F55255-3B4A-4616-B6F8-0A66537C5D82}" destId="{8A748C3E-CE62-4E92-A0FE-1F5548AC9D02}" srcOrd="0" destOrd="6" presId="urn:microsoft.com/office/officeart/2005/8/layout/list1"/>
-    <dgm:cxn modelId="{DA525E1A-7FFF-4B9B-979A-37830A1A6822}" type="presOf" srcId="{24C10798-75D1-47C0-A4DB-CA289CC5805B}" destId="{8A748C3E-CE62-4E92-A0FE-1F5548AC9D02}" srcOrd="0" destOrd="7" presId="urn:microsoft.com/office/officeart/2005/8/layout/list1"/>
-    <dgm:cxn modelId="{9C280A1C-C029-4E7F-999E-A84766E633AD}" type="presOf" srcId="{3ACFCC25-7784-4356-B8DF-A35CF2CC5237}" destId="{8A748C3E-CE62-4E92-A0FE-1F5548AC9D02}" srcOrd="0" destOrd="3" presId="urn:microsoft.com/office/officeart/2005/8/layout/list1"/>
-    <dgm:cxn modelId="{89A26634-7323-49E3-997A-5445C4214B35}" srcId="{EE76E364-6A46-492A-9FD7-63C775ADA808}" destId="{EA4C9FAE-8632-437A-94BC-F7324DD67615}" srcOrd="5" destOrd="0" parTransId="{933F93DC-F2BC-4901-9B93-BEDA7E1295ED}" sibTransId="{18CF30EE-9734-4EDB-80FF-201F7A903B36}"/>
+    <dgm:cxn modelId="{D9D7BA05-199F-4FE9-9878-0E591DD851B2}" type="presOf" srcId="{147F1B68-2F1B-4E54-A64E-FDF57E94FBAE}" destId="{8A748C3E-CE62-4E92-A0FE-1F5548AC9D02}" srcOrd="0" destOrd="13" presId="urn:microsoft.com/office/officeart/2005/8/layout/list1"/>
+    <dgm:cxn modelId="{14B98007-77D4-4912-903C-B59BB2A0071F}" type="presOf" srcId="{9D2878A0-3308-49D9-9E8B-BB7B16C5666C}" destId="{8A748C3E-CE62-4E92-A0FE-1F5548AC9D02}" srcOrd="0" destOrd="4" presId="urn:microsoft.com/office/officeart/2005/8/layout/list1"/>
+    <dgm:cxn modelId="{248A3716-A158-479A-925B-4FBEDA81A7A4}" srcId="{EE76E364-6A46-492A-9FD7-63C775ADA808}" destId="{81C5FAF5-7969-428F-9168-FEA62E83FEE0}" srcOrd="9" destOrd="0" parTransId="{F85420F4-2BF4-48A2-BC52-21EE60C7088A}" sibTransId="{76ECC8FB-B797-4F4E-8993-577D9FE42A74}"/>
+    <dgm:cxn modelId="{3D640618-1354-4F40-9A9D-E62C774DB987}" type="presOf" srcId="{F5F55255-3B4A-4616-B6F8-0A66537C5D82}" destId="{8A748C3E-CE62-4E92-A0FE-1F5548AC9D02}" srcOrd="0" destOrd="11" presId="urn:microsoft.com/office/officeart/2005/8/layout/list1"/>
+    <dgm:cxn modelId="{840D5C1D-67E8-40B6-B6FE-29E3426538FE}" type="presOf" srcId="{81C5FAF5-7969-428F-9168-FEA62E83FEE0}" destId="{8A748C3E-CE62-4E92-A0FE-1F5548AC9D02}" srcOrd="0" destOrd="9" presId="urn:microsoft.com/office/officeart/2005/8/layout/list1"/>
+    <dgm:cxn modelId="{C4653128-9530-4777-A348-542D422C2F4C}" srcId="{EE76E364-6A46-492A-9FD7-63C775ADA808}" destId="{47035833-554B-4E51-989B-BBBA7CB2F1B2}" srcOrd="3" destOrd="0" parTransId="{90EBB25F-9B48-4B19-B9EE-674C6F7D6E33}" sibTransId="{D685D6C1-2BC9-402B-BD46-4FA2EE1F5CC1}"/>
+    <dgm:cxn modelId="{89A26634-7323-49E3-997A-5445C4214B35}" srcId="{EE76E364-6A46-492A-9FD7-63C775ADA808}" destId="{EA4C9FAE-8632-437A-94BC-F7324DD67615}" srcOrd="10" destOrd="0" parTransId="{933F93DC-F2BC-4901-9B93-BEDA7E1295ED}" sibTransId="{18CF30EE-9734-4EDB-80FF-201F7A903B36}"/>
     <dgm:cxn modelId="{0C848A3D-3553-4924-8D80-54F69669587F}" type="presOf" srcId="{228ADC0D-83DA-40CE-9EF2-B2A23B2BA12F}" destId="{529C8736-509C-426A-B1AF-D9FE39FB5B28}" srcOrd="0" destOrd="0" presId="urn:microsoft.com/office/officeart/2005/8/layout/list1"/>
-    <dgm:cxn modelId="{628B0D5B-E06C-4FD6-A68C-4484D8743AE9}" type="presOf" srcId="{147F1B68-2F1B-4E54-A64E-FDF57E94FBAE}" destId="{8A748C3E-CE62-4E92-A0FE-1F5548AC9D02}" srcOrd="0" destOrd="8" presId="urn:microsoft.com/office/officeart/2005/8/layout/list1"/>
-    <dgm:cxn modelId="{AF834E48-FD81-433D-B1B2-2CCD7D74765A}" srcId="{EE76E364-6A46-492A-9FD7-63C775ADA808}" destId="{BCA671DB-9D16-4302-B7A8-56BF6E3543A9}" srcOrd="2" destOrd="0" parTransId="{E2DB0A18-721A-4D89-AC8F-ECFB539A4977}" sibTransId="{EC660C46-8325-4A10-8E43-5BBCD693556D}"/>
+    <dgm:cxn modelId="{C2BA9945-9B20-45E7-AF9B-689821493901}" type="presOf" srcId="{FB7856FD-14F6-497F-A96F-439DE861ECA4}" destId="{8A748C3E-CE62-4E92-A0FE-1F5548AC9D02}" srcOrd="0" destOrd="0" presId="urn:microsoft.com/office/officeart/2005/8/layout/list1"/>
+    <dgm:cxn modelId="{157AD865-39E9-4394-AD26-FA162D902D24}" srcId="{EE76E364-6A46-492A-9FD7-63C775ADA808}" destId="{3ACFCC25-7784-4356-B8DF-A35CF2CC5237}" srcOrd="8" destOrd="0" parTransId="{1FFA7EC9-892D-4681-A9B1-5FE3969C5613}" sibTransId="{423D80BF-E726-4A72-8017-67F8D9F24CD1}"/>
+    <dgm:cxn modelId="{AF834E48-FD81-433D-B1B2-2CCD7D74765A}" srcId="{EE76E364-6A46-492A-9FD7-63C775ADA808}" destId="{BCA671DB-9D16-4302-B7A8-56BF6E3543A9}" srcOrd="7" destOrd="0" parTransId="{E2DB0A18-721A-4D89-AC8F-ECFB539A4977}" sibTransId="{EC660C46-8325-4A10-8E43-5BBCD693556D}"/>
     <dgm:cxn modelId="{F609747B-AE71-4ACA-93A0-5C6C9FA2C6E1}" srcId="{EE76E364-6A46-492A-9FD7-63C775ADA808}" destId="{FB7856FD-14F6-497F-A96F-439DE861ECA4}" srcOrd="0" destOrd="0" parTransId="{B2A71A46-24A2-44C1-B6DD-257439AFBC0A}" sibTransId="{AED585D0-E158-48D1-8037-5DB08D2C892B}"/>
+    <dgm:cxn modelId="{B3BC947E-A5B7-4BD5-83C5-0F0990E73AA5}" type="presOf" srcId="{EE76E364-6A46-492A-9FD7-63C775ADA808}" destId="{0E75AC4A-956D-493C-A82B-572CF3B1603B}" srcOrd="0" destOrd="0" presId="urn:microsoft.com/office/officeart/2005/8/layout/list1"/>
     <dgm:cxn modelId="{32E73583-EC60-44EC-A1BF-54C8775B331D}" srcId="{EA4C9FAE-8632-437A-94BC-F7324DD67615}" destId="{24C10798-75D1-47C0-A4DB-CA289CC5805B}" srcOrd="1" destOrd="0" parTransId="{CCB71030-2EA5-4506-92EC-221C09CE28D3}" sibTransId="{ACEF8760-0D4C-4F48-B99C-551EED1CF848}"/>
-    <dgm:cxn modelId="{27F0BE87-1F53-4513-854E-A9EF65EBF7FE}" srcId="{EE76E364-6A46-492A-9FD7-63C775ADA808}" destId="{3850311C-A53C-4052-BDD5-F5866951D844}" srcOrd="1" destOrd="0" parTransId="{1093B51F-1E48-46C6-B64A-7D72D2D61ACC}" sibTransId="{B85F275C-6B08-4B47-A49E-6839949226DE}"/>
-    <dgm:cxn modelId="{D3DDFC8D-E675-4B05-8D8F-1BB4A9CE7573}" type="presOf" srcId="{3850311C-A53C-4052-BDD5-F5866951D844}" destId="{8A748C3E-CE62-4E92-A0FE-1F5548AC9D02}" srcOrd="0" destOrd="1" presId="urn:microsoft.com/office/officeart/2005/8/layout/list1"/>
-    <dgm:cxn modelId="{C62AC98E-E928-42FA-A277-7F38775C0B7E}" srcId="{EE76E364-6A46-492A-9FD7-63C775ADA808}" destId="{3ACFCC25-7784-4356-B8DF-A35CF2CC5237}" srcOrd="3" destOrd="0" parTransId="{1FFA7EC9-892D-4681-A9B1-5FE3969C5613}" sibTransId="{423D80BF-E726-4A72-8017-67F8D9F24CD1}"/>
-    <dgm:cxn modelId="{EDA2B0A6-6285-42C8-ACD6-A0ED11956F63}" srcId="{EE76E364-6A46-492A-9FD7-63C775ADA808}" destId="{147F1B68-2F1B-4E54-A64E-FDF57E94FBAE}" srcOrd="6" destOrd="0" parTransId="{BB5E3B85-D782-4999-882E-B3E92E827653}" sibTransId="{7A783848-5787-4168-A501-C8A8796F4A23}"/>
+    <dgm:cxn modelId="{F7EA5785-3780-49CB-8439-3772D648A86E}" srcId="{EE76E364-6A46-492A-9FD7-63C775ADA808}" destId="{3083C0AC-5FAE-4A98-AD65-B00E46317EAA}" srcOrd="6" destOrd="0" parTransId="{6D46ADC7-98F1-4B44-8ABD-9CF9E2656DEB}" sibTransId="{24B2D5EA-2F1B-49BD-ACC9-DCDED6EDC43F}"/>
+    <dgm:cxn modelId="{8C265198-3772-4E2A-AD6C-ABEF95119153}" srcId="{EE76E364-6A46-492A-9FD7-63C775ADA808}" destId="{E81EBE7F-1B29-4F3B-9D90-F27A5F52A4F7}" srcOrd="1" destOrd="0" parTransId="{901F6192-51CD-49F4-8A54-859AB828A347}" sibTransId="{3D557813-893F-4AAA-9A58-5F46E98736F6}"/>
+    <dgm:cxn modelId="{84876A9C-E00F-443E-A7E6-6DD38906E2FB}" type="presOf" srcId="{E81EBE7F-1B29-4F3B-9D90-F27A5F52A4F7}" destId="{8A748C3E-CE62-4E92-A0FE-1F5548AC9D02}" srcOrd="0" destOrd="1" presId="urn:microsoft.com/office/officeart/2005/8/layout/list1"/>
+    <dgm:cxn modelId="{EDA2B0A6-6285-42C8-ACD6-A0ED11956F63}" srcId="{EE76E364-6A46-492A-9FD7-63C775ADA808}" destId="{147F1B68-2F1B-4E54-A64E-FDF57E94FBAE}" srcOrd="11" destOrd="0" parTransId="{BB5E3B85-D782-4999-882E-B3E92E827653}" sibTransId="{7A783848-5787-4168-A501-C8A8796F4A23}"/>
+    <dgm:cxn modelId="{B76A21A7-70BB-44B5-B32D-C58036ECCDA6}" type="presOf" srcId="{BCA671DB-9D16-4302-B7A8-56BF6E3543A9}" destId="{8A748C3E-CE62-4E92-A0FE-1F5548AC9D02}" srcOrd="0" destOrd="7" presId="urn:microsoft.com/office/officeart/2005/8/layout/list1"/>
     <dgm:cxn modelId="{D3CD3EAD-7193-4575-98B5-F9317CE4FB43}" srcId="{EA4C9FAE-8632-437A-94BC-F7324DD67615}" destId="{F5F55255-3B4A-4616-B6F8-0A66537C5D82}" srcOrd="0" destOrd="0" parTransId="{AF394C79-B2A6-4DCB-885D-CE8D2685EC33}" sibTransId="{E6592C2A-BD5F-424A-817B-CCDA29892586}"/>
-    <dgm:cxn modelId="{A22FD4B2-7A35-4E88-9759-5C8856D49BA3}" type="presOf" srcId="{EA4C9FAE-8632-437A-94BC-F7324DD67615}" destId="{8A748C3E-CE62-4E92-A0FE-1F5548AC9D02}" srcOrd="0" destOrd="5" presId="urn:microsoft.com/office/officeart/2005/8/layout/list1"/>
-    <dgm:cxn modelId="{A1F187D5-2309-485A-9E59-78CEC5B4B9EB}" type="presOf" srcId="{EE76E364-6A46-492A-9FD7-63C775ADA808}" destId="{EF67F11A-FCD0-4E59-A23F-17BCC3FB1182}" srcOrd="1" destOrd="0" presId="urn:microsoft.com/office/officeart/2005/8/layout/list1"/>
+    <dgm:cxn modelId="{F84649BA-7494-44A8-B0DE-BA2DCD49178C}" type="presOf" srcId="{EA4C9FAE-8632-437A-94BC-F7324DD67615}" destId="{8A748C3E-CE62-4E92-A0FE-1F5548AC9D02}" srcOrd="0" destOrd="10" presId="urn:microsoft.com/office/officeart/2005/8/layout/list1"/>
+    <dgm:cxn modelId="{BFE189BB-5BD9-4F0A-BD9B-543D5DD3CE84}" type="presOf" srcId="{C07C55AE-257E-4178-8EDE-747334E3BDE5}" destId="{8A748C3E-CE62-4E92-A0FE-1F5548AC9D02}" srcOrd="0" destOrd="2" presId="urn:microsoft.com/office/officeart/2005/8/layout/list1"/>
+    <dgm:cxn modelId="{AE4F18C4-3F5E-4FD9-A2F6-D226C34980FB}" type="presOf" srcId="{3ACFCC25-7784-4356-B8DF-A35CF2CC5237}" destId="{8A748C3E-CE62-4E92-A0FE-1F5548AC9D02}" srcOrd="0" destOrd="8" presId="urn:microsoft.com/office/officeart/2005/8/layout/list1"/>
+    <dgm:cxn modelId="{A3B613D5-E298-425B-9F5F-232D5869B052}" type="presOf" srcId="{47035833-554B-4E51-989B-BBBA7CB2F1B2}" destId="{8A748C3E-CE62-4E92-A0FE-1F5548AC9D02}" srcOrd="0" destOrd="3" presId="urn:microsoft.com/office/officeart/2005/8/layout/list1"/>
+    <dgm:cxn modelId="{09F294D5-E7D0-4977-AFCF-473D4E4CF3FD}" type="presOf" srcId="{3083C0AC-5FAE-4A98-AD65-B00E46317EAA}" destId="{8A748C3E-CE62-4E92-A0FE-1F5548AC9D02}" srcOrd="0" destOrd="6" presId="urn:microsoft.com/office/officeart/2005/8/layout/list1"/>
     <dgm:cxn modelId="{8ADAB9E6-BB3B-4581-9B45-07948A4AEA67}" srcId="{228ADC0D-83DA-40CE-9EF2-B2A23B2BA12F}" destId="{EE76E364-6A46-492A-9FD7-63C775ADA808}" srcOrd="0" destOrd="0" parTransId="{522B9AE2-1358-4DCB-B21B-51AD7A4CC3B6}" sibTransId="{119AEC78-9891-4081-85AD-AAE5114E48ED}"/>
-    <dgm:cxn modelId="{4F9365FF-2D6F-4D0D-9E60-1782CBB99FAC}" type="presOf" srcId="{FB7856FD-14F6-497F-A96F-439DE861ECA4}" destId="{8A748C3E-CE62-4E92-A0FE-1F5548AC9D02}" srcOrd="0" destOrd="0" presId="urn:microsoft.com/office/officeart/2005/8/layout/list1"/>
-    <dgm:cxn modelId="{5070C104-B1E1-40F1-A0DE-97F4F4CD7310}" type="presParOf" srcId="{529C8736-509C-426A-B1AF-D9FE39FB5B28}" destId="{8BC7EA25-256B-410A-8E19-CC15A19D412A}" srcOrd="0" destOrd="0" presId="urn:microsoft.com/office/officeart/2005/8/layout/list1"/>
-    <dgm:cxn modelId="{204DA009-B3F1-4225-839C-DF0A8826F00A}" type="presParOf" srcId="{8BC7EA25-256B-410A-8E19-CC15A19D412A}" destId="{0E75AC4A-956D-493C-A82B-572CF3B1603B}" srcOrd="0" destOrd="0" presId="urn:microsoft.com/office/officeart/2005/8/layout/list1"/>
-    <dgm:cxn modelId="{D8782D56-DDA4-486D-8333-D9521FAE6776}" type="presParOf" srcId="{8BC7EA25-256B-410A-8E19-CC15A19D412A}" destId="{EF67F11A-FCD0-4E59-A23F-17BCC3FB1182}" srcOrd="1" destOrd="0" presId="urn:microsoft.com/office/officeart/2005/8/layout/list1"/>
-    <dgm:cxn modelId="{836B591A-C28B-4C37-AF15-8B5DBC70DA21}" type="presParOf" srcId="{529C8736-509C-426A-B1AF-D9FE39FB5B28}" destId="{E84E3A97-5D14-4C15-B06F-E00215B154CE}" srcOrd="1" destOrd="0" presId="urn:microsoft.com/office/officeart/2005/8/layout/list1"/>
-    <dgm:cxn modelId="{8BA68BD2-7FDC-4C1D-AF1A-DD92BF1A2A14}" type="presParOf" srcId="{529C8736-509C-426A-B1AF-D9FE39FB5B28}" destId="{8A748C3E-CE62-4E92-A0FE-1F5548AC9D02}" srcOrd="2" destOrd="0" presId="urn:microsoft.com/office/officeart/2005/8/layout/list1"/>
+    <dgm:cxn modelId="{3BB3C8E8-AC4E-47D2-9540-45FFF6AC9690}" type="presOf" srcId="{EE76E364-6A46-492A-9FD7-63C775ADA808}" destId="{EF67F11A-FCD0-4E59-A23F-17BCC3FB1182}" srcOrd="1" destOrd="0" presId="urn:microsoft.com/office/officeart/2005/8/layout/list1"/>
+    <dgm:cxn modelId="{BC9D0CF3-EF2F-4E70-8F4F-A14AED17E420}" type="presOf" srcId="{1E54DBF2-0B1C-465C-A75E-DD6A16A0630B}" destId="{8A748C3E-CE62-4E92-A0FE-1F5548AC9D02}" srcOrd="0" destOrd="5" presId="urn:microsoft.com/office/officeart/2005/8/layout/list1"/>
+    <dgm:cxn modelId="{1746BAF4-7F83-4E61-BBA9-235227B536CB}" srcId="{EE76E364-6A46-492A-9FD7-63C775ADA808}" destId="{1E54DBF2-0B1C-465C-A75E-DD6A16A0630B}" srcOrd="5" destOrd="0" parTransId="{E34D0822-23EB-47BC-B7A4-28DE0FA75F12}" sibTransId="{65F8CC45-709D-41D6-88A2-C7DB84C09C2B}"/>
+    <dgm:cxn modelId="{A8A3D9F5-A188-48D3-9244-3B98C42FF9F0}" type="presOf" srcId="{24C10798-75D1-47C0-A4DB-CA289CC5805B}" destId="{8A748C3E-CE62-4E92-A0FE-1F5548AC9D02}" srcOrd="0" destOrd="12" presId="urn:microsoft.com/office/officeart/2005/8/layout/list1"/>
+    <dgm:cxn modelId="{AEF394F9-D7FB-464B-AFA5-C5B843046B96}" srcId="{EE76E364-6A46-492A-9FD7-63C775ADA808}" destId="{9D2878A0-3308-49D9-9E8B-BB7B16C5666C}" srcOrd="4" destOrd="0" parTransId="{2C603990-4AF4-4301-850D-F66262D359B2}" sibTransId="{BDB38DF0-81C7-4A1C-BFE2-56278E86F3DB}"/>
+    <dgm:cxn modelId="{AE67C9F9-2F25-47CF-A235-1DBDA1B04B18}" srcId="{EE76E364-6A46-492A-9FD7-63C775ADA808}" destId="{C07C55AE-257E-4178-8EDE-747334E3BDE5}" srcOrd="2" destOrd="0" parTransId="{57396DED-E5BD-47EF-A274-349AC9A0A616}" sibTransId="{F966E27C-520B-4A2A-9EB2-BFF87F80813F}"/>
+    <dgm:cxn modelId="{46739878-F7F4-4DB2-B6EC-852151A5BAB4}" type="presParOf" srcId="{529C8736-509C-426A-B1AF-D9FE39FB5B28}" destId="{8BC7EA25-256B-410A-8E19-CC15A19D412A}" srcOrd="0" destOrd="0" presId="urn:microsoft.com/office/officeart/2005/8/layout/list1"/>
+    <dgm:cxn modelId="{AAA9F26B-8633-42E9-8A07-EB7505929DFA}" type="presParOf" srcId="{8BC7EA25-256B-410A-8E19-CC15A19D412A}" destId="{0E75AC4A-956D-493C-A82B-572CF3B1603B}" srcOrd="0" destOrd="0" presId="urn:microsoft.com/office/officeart/2005/8/layout/list1"/>
+    <dgm:cxn modelId="{375EA17A-C483-494B-86F4-F3D979469F7B}" type="presParOf" srcId="{8BC7EA25-256B-410A-8E19-CC15A19D412A}" destId="{EF67F11A-FCD0-4E59-A23F-17BCC3FB1182}" srcOrd="1" destOrd="0" presId="urn:microsoft.com/office/officeart/2005/8/layout/list1"/>
+    <dgm:cxn modelId="{288997A1-1D30-41D7-8465-C8BDAEED12F1}" type="presParOf" srcId="{529C8736-509C-426A-B1AF-D9FE39FB5B28}" destId="{E84E3A97-5D14-4C15-B06F-E00215B154CE}" srcOrd="1" destOrd="0" presId="urn:microsoft.com/office/officeart/2005/8/layout/list1"/>
+    <dgm:cxn modelId="{0D8241A1-F9B5-4371-8D1A-64873B9BF75A}" type="presParOf" srcId="{529C8736-509C-426A-B1AF-D9FE39FB5B28}" destId="{8A748C3E-CE62-4E92-A0FE-1F5548AC9D02}" srcOrd="2" destOrd="0" presId="urn:microsoft.com/office/officeart/2005/8/layout/list1"/>
   </dgm:cxnLst>
   <dgm:bg/>
   <dgm:whole/>
@@ -5592,8 +5848,8 @@
       </dsp:nvSpPr>
       <dsp:spPr>
         <a:xfrm>
-          <a:off x="0" y="52113"/>
-          <a:ext cx="7086599" cy="5980602"/>
+          <a:off x="0" y="0"/>
+          <a:ext cx="8382000" cy="6483266"/>
         </a:xfrm>
         <a:prstGeom prst="rect">
           <a:avLst/>
@@ -5629,7 +5885,7 @@
         <a:fontRef idx="minor"/>
       </dsp:style>
       <dsp:txBody>
-        <a:bodyPr spcFirstLastPara="0" vert="horz" wrap="square" lIns="549999" tIns="1041400" rIns="549999" bIns="156464" numCol="1" spcCol="1270" anchor="t" anchorCtr="0">
+        <a:bodyPr spcFirstLastPara="0" vert="horz" wrap="square" lIns="650536" tIns="728980" rIns="650536" bIns="156464" numCol="1" spcCol="1270" anchor="t" anchorCtr="0">
           <a:noAutofit/>
         </a:bodyPr>
         <a:lstStyle/>
@@ -5660,7 +5916,7 @@
               <a:spcPct val="15000"/>
             </a:spcAft>
             <a:buFont typeface="Arial" panose="020B0604020202020204" pitchFamily="34" charset="0"/>
-            <a:buChar char="•"/>
+            <a:buNone/>
           </a:pPr>
           <a:r>
             <a:rPr lang="it-IT" sz="2200" b="1" kern="1200" dirty="0" err="1"/>
@@ -5668,15 +5924,51 @@
           </a:r>
           <a:r>
             <a:rPr lang="it-IT" sz="2200" b="1" kern="1200" dirty="0"/>
-            <a:t> (v21) in </a:t>
-          </a:r>
-          <a:r>
-            <a:rPr lang="it-IT" sz="2200" b="1" kern="1200" dirty="0" err="1"/>
-            <a:t>TypeScript</a:t>
-          </a:r>
-          <a:r>
-            <a:rPr lang="it-IT" sz="2200" b="1" kern="1200" dirty="0"/>
-            <a:t> su ambiente Node.js v24</a:t>
+            <a:t> (v21) su ambiente Node.js v24</a:t>
+          </a:r>
+          <a:endParaRPr lang="en-US" sz="2200" kern="1200" dirty="0"/>
+        </a:p>
+        <a:p>
+          <a:pPr marL="228600" lvl="1" indent="-228600" algn="l" defTabSz="977900">
+            <a:lnSpc>
+              <a:spcPct val="90000"/>
+            </a:lnSpc>
+            <a:spcBef>
+              <a:spcPct val="0"/>
+            </a:spcBef>
+            <a:spcAft>
+              <a:spcPct val="15000"/>
+            </a:spcAft>
+            <a:buFont typeface="Arial" panose="020B0604020202020204" pitchFamily="34" charset="0"/>
+            <a:buNone/>
+          </a:pPr>
+          <a:endParaRPr lang="en-US" sz="2200" kern="1200" dirty="0"/>
+        </a:p>
+        <a:p>
+          <a:pPr marL="228600" lvl="1" indent="-228600" algn="l" defTabSz="977900">
+            <a:lnSpc>
+              <a:spcPct val="90000"/>
+            </a:lnSpc>
+            <a:spcBef>
+              <a:spcPct val="0"/>
+            </a:spcBef>
+            <a:spcAft>
+              <a:spcPct val="15000"/>
+            </a:spcAft>
+            <a:buFont typeface="Arial" panose="020B0604020202020204" pitchFamily="34" charset="0"/>
+            <a:buNone/>
+          </a:pPr>
+          <a:r>
+            <a:rPr lang="en-US" sz="2200" b="0" kern="1200" dirty="0" err="1"/>
+            <a:t>Scelta</a:t>
+          </a:r>
+          <a:r>
+            <a:rPr lang="en-US" sz="2200" b="0" kern="1200" dirty="0"/>
+            <a:t> di </a:t>
+          </a:r>
+          <a:r>
+            <a:rPr lang="en-US" sz="2200" b="1" kern="1200" dirty="0"/>
+            <a:t>Angular Vs React:</a:t>
           </a:r>
           <a:endParaRPr lang="en-US" sz="2200" kern="1200" dirty="0"/>
         </a:p>
@@ -5696,63 +5988,11 @@
           </a:pPr>
           <a:r>
             <a:rPr lang="en-US" sz="2200" kern="1200" dirty="0"/>
-            <a:t>Progettazione in </a:t>
-          </a:r>
-          <a:r>
-            <a:rPr lang="en-US" sz="2200" b="1" kern="1200" dirty="0"/>
-            <a:t>Components, </a:t>
-          </a:r>
-          <a:r>
-            <a:rPr lang="en-US" sz="2200" b="0" kern="1200" dirty="0" err="1"/>
-            <a:t>ognuno</a:t>
-          </a:r>
-          <a:r>
-            <a:rPr lang="en-US" sz="2200" b="0" kern="1200" dirty="0"/>
-            <a:t> </a:t>
-          </a:r>
-          <a:r>
-            <a:rPr lang="en-US" sz="2200" b="0" kern="1200" dirty="0" err="1"/>
-            <a:t>definisce</a:t>
-          </a:r>
-          <a:r>
-            <a:rPr lang="en-US" sz="2200" b="0" kern="1200" dirty="0"/>
-            <a:t> </a:t>
+            <a:t>Framework vs </a:t>
           </a:r>
           <a:r>
             <a:rPr lang="en-US" sz="2200" kern="1200" dirty="0" err="1"/>
-            <a:t>una</a:t>
-          </a:r>
-          <a:r>
-            <a:rPr lang="en-US" sz="2200" kern="1200" dirty="0"/>
-            <a:t> </a:t>
-          </a:r>
-          <a:r>
-            <a:rPr lang="en-US" sz="2200" kern="1200" dirty="0" err="1"/>
-            <a:t>singola</a:t>
-          </a:r>
-          <a:r>
-            <a:rPr lang="en-US" sz="2200" kern="1200" dirty="0"/>
-            <a:t> </a:t>
-          </a:r>
-          <a:r>
-            <a:rPr lang="en-US" sz="2200" kern="1200" dirty="0" err="1"/>
-            <a:t>pagina</a:t>
-          </a:r>
-          <a:r>
-            <a:rPr lang="en-US" sz="2200" kern="1200" dirty="0"/>
-            <a:t>: es. </a:t>
-          </a:r>
-          <a:r>
-            <a:rPr lang="it-IT" sz="2200" b="0" kern="1200" dirty="0" err="1"/>
-            <a:t>AiAssistant</a:t>
-          </a:r>
-          <a:r>
-            <a:rPr lang="en-US" sz="2200" kern="1200" dirty="0"/>
-            <a:t>, </a:t>
-          </a:r>
-          <a:r>
-            <a:rPr lang="it-IT" sz="2200" b="0" kern="1200" dirty="0" err="1"/>
-            <a:t>AiCopilot</a:t>
+            <a:t>libreria</a:t>
           </a:r>
           <a:endParaRPr lang="en-US" sz="2200" kern="1200" dirty="0"/>
         </a:p>
@@ -5772,29 +6012,40 @@
           </a:pPr>
           <a:r>
             <a:rPr lang="en-US" sz="2200" kern="1200" dirty="0"/>
-            <a:t>2 </a:t>
+            <a:t>OOP vs </a:t>
           </a:r>
           <a:r>
             <a:rPr lang="en-US" sz="2200" kern="1200" dirty="0" err="1"/>
-            <a:t>classi</a:t>
-          </a:r>
-          <a:r>
-            <a:rPr lang="en-US" sz="2200" kern="1200" dirty="0"/>
-            <a:t> di Servizi: </a:t>
-          </a:r>
-          <a:r>
-            <a:rPr lang="it-IT" sz="2200" b="0" kern="1200" dirty="0" err="1"/>
-            <a:t>ConversationsService</a:t>
-          </a:r>
-          <a:r>
-            <a:rPr lang="it-IT" sz="2200" b="0" kern="1200" dirty="0"/>
-            <a:t>, </a:t>
-          </a:r>
-          <a:r>
-            <a:rPr lang="it-IT" sz="2200" b="0" kern="1200" dirty="0" err="1"/>
-            <a:t>DocumentsService</a:t>
+            <a:t>funzionale</a:t>
           </a:r>
           <a:endParaRPr lang="en-US" sz="2200" kern="1200" dirty="0"/>
+        </a:p>
+        <a:p>
+          <a:pPr marL="228600" lvl="1" indent="-228600" algn="l" defTabSz="977900">
+            <a:lnSpc>
+              <a:spcPct val="90000"/>
+            </a:lnSpc>
+            <a:spcBef>
+              <a:spcPct val="0"/>
+            </a:spcBef>
+            <a:spcAft>
+              <a:spcPct val="15000"/>
+            </a:spcAft>
+            <a:buFont typeface="Arial" panose="020B0604020202020204" pitchFamily="34" charset="0"/>
+            <a:buNone/>
+          </a:pPr>
+          <a:r>
+            <a:rPr lang="en-US" sz="2200" b="1" kern="1200" dirty="0"/>
+            <a:t>Angular </a:t>
+          </a:r>
+          <a:r>
+            <a:rPr lang="en-US" sz="2200" b="1" kern="1200" dirty="0" err="1"/>
+            <a:t>nel</a:t>
+          </a:r>
+          <a:r>
+            <a:rPr lang="en-US" sz="2200" b="1" kern="1200" dirty="0"/>
+            <a:t> nostro POC:</a:t>
+          </a:r>
         </a:p>
         <a:p>
           <a:pPr marL="228600" lvl="1" indent="-228600" algn="l" defTabSz="977900">
@@ -5811,26 +6062,66 @@
             <a:buChar char="•"/>
           </a:pPr>
           <a:r>
-            <a:rPr lang="it-IT" sz="2200" kern="1200" dirty="0"/>
-            <a:t>architettura </a:t>
-          </a:r>
-          <a:r>
-            <a:rPr lang="it-IT" sz="2200" b="1" kern="1200" dirty="0"/>
-            <a:t>SPA</a:t>
-          </a:r>
-          <a:r>
-            <a:rPr lang="it-IT" sz="2200" kern="1200" dirty="0"/>
-            <a:t> basata su </a:t>
-          </a:r>
-          <a:r>
-            <a:rPr lang="it-IT" sz="2200" b="1" kern="1200" dirty="0" err="1"/>
-            <a:t>Angular</a:t>
-          </a:r>
-          <a:r>
-            <a:rPr lang="it-IT" sz="2200" b="1" kern="1200" dirty="0"/>
-            <a:t> Router</a:t>
-          </a:r>
-          <a:endParaRPr lang="en-US" sz="2200" b="1" kern="1200" dirty="0"/>
+            <a:rPr lang="en-US" sz="2200" kern="1200" dirty="0"/>
+            <a:t>Progettazione in </a:t>
+          </a:r>
+          <a:r>
+            <a:rPr lang="en-US" sz="2200" b="1" kern="1200" dirty="0"/>
+            <a:t>Components, </a:t>
+          </a:r>
+          <a:r>
+            <a:rPr lang="en-US" sz="2200" b="0" kern="1200" dirty="0" err="1"/>
+            <a:t>ognuno</a:t>
+          </a:r>
+          <a:r>
+            <a:rPr lang="en-US" sz="2200" b="0" kern="1200" dirty="0"/>
+            <a:t> </a:t>
+          </a:r>
+          <a:r>
+            <a:rPr lang="en-US" sz="2200" b="0" kern="1200" dirty="0" err="1"/>
+            <a:t>definisce</a:t>
+          </a:r>
+          <a:r>
+            <a:rPr lang="en-US" sz="2200" b="0" kern="1200" dirty="0"/>
+            <a:t> </a:t>
+          </a:r>
+          <a:r>
+            <a:rPr lang="en-US" sz="2200" kern="1200" dirty="0" err="1"/>
+            <a:t>una</a:t>
+          </a:r>
+          <a:r>
+            <a:rPr lang="en-US" sz="2200" kern="1200" dirty="0"/>
+            <a:t> </a:t>
+          </a:r>
+          <a:r>
+            <a:rPr lang="en-US" sz="2200" kern="1200" dirty="0" err="1"/>
+            <a:t>singola</a:t>
+          </a:r>
+          <a:r>
+            <a:rPr lang="en-US" sz="2200" kern="1200" dirty="0"/>
+            <a:t> </a:t>
+          </a:r>
+          <a:r>
+            <a:rPr lang="en-US" sz="2200" kern="1200" dirty="0" err="1"/>
+            <a:t>pagina</a:t>
+          </a:r>
+          <a:r>
+            <a:rPr lang="en-US" sz="2200" kern="1200" dirty="0"/>
+            <a:t>: es. </a:t>
+          </a:r>
+          <a:r>
+            <a:rPr lang="it-IT" sz="2200" b="0" kern="1200" dirty="0" err="1"/>
+            <a:t>AiAssistant</a:t>
+          </a:r>
+          <a:r>
+            <a:rPr lang="en-US" sz="2200" kern="1200" dirty="0"/>
+            <a:t>, </a:t>
+          </a:r>
+          <a:r>
+            <a:rPr lang="it-IT" sz="2200" b="0" kern="1200" dirty="0" err="1"/>
+            <a:t>AiCopilot</a:t>
+          </a:r>
+          <a:endParaRPr lang="en-US" sz="2200" kern="1200" dirty="0"/>
         </a:p>
         <a:p>
           <a:pPr marL="228600" lvl="1" indent="-228600" algn="l" defTabSz="977900">
@@ -5847,6 +6138,82 @@
             <a:buChar char="•"/>
           </a:pPr>
           <a:r>
+            <a:rPr lang="en-US" sz="2200" kern="1200" dirty="0"/>
+            <a:t>2 </a:t>
+          </a:r>
+          <a:r>
+            <a:rPr lang="en-US" sz="2200" kern="1200" dirty="0" err="1"/>
+            <a:t>classi</a:t>
+          </a:r>
+          <a:r>
+            <a:rPr lang="en-US" sz="2200" kern="1200" dirty="0"/>
+            <a:t> di Servizi: </a:t>
+          </a:r>
+          <a:r>
+            <a:rPr lang="it-IT" sz="2200" b="0" kern="1200" dirty="0" err="1"/>
+            <a:t>ConversationsService</a:t>
+          </a:r>
+          <a:r>
+            <a:rPr lang="it-IT" sz="2200" b="0" kern="1200" dirty="0"/>
+            <a:t>, </a:t>
+          </a:r>
+          <a:r>
+            <a:rPr lang="it-IT" sz="2200" b="0" kern="1200" dirty="0" err="1"/>
+            <a:t>DocumentsService</a:t>
+          </a:r>
+          <a:endParaRPr lang="en-US" sz="2200" kern="1200" dirty="0"/>
+        </a:p>
+        <a:p>
+          <a:pPr marL="228600" lvl="1" indent="-228600" algn="l" defTabSz="977900">
+            <a:lnSpc>
+              <a:spcPct val="90000"/>
+            </a:lnSpc>
+            <a:spcBef>
+              <a:spcPct val="0"/>
+            </a:spcBef>
+            <a:spcAft>
+              <a:spcPct val="15000"/>
+            </a:spcAft>
+            <a:buFont typeface="Arial" panose="020B0604020202020204" pitchFamily="34" charset="0"/>
+            <a:buChar char="•"/>
+          </a:pPr>
+          <a:r>
+            <a:rPr lang="it-IT" sz="2200" kern="1200" dirty="0"/>
+            <a:t>architettura </a:t>
+          </a:r>
+          <a:r>
+            <a:rPr lang="it-IT" sz="2200" b="1" kern="1200" dirty="0"/>
+            <a:t>SPA</a:t>
+          </a:r>
+          <a:r>
+            <a:rPr lang="it-IT" sz="2200" kern="1200" dirty="0"/>
+            <a:t> basata su </a:t>
+          </a:r>
+          <a:r>
+            <a:rPr lang="it-IT" sz="2200" b="1" kern="1200" dirty="0" err="1"/>
+            <a:t>Angular</a:t>
+          </a:r>
+          <a:r>
+            <a:rPr lang="it-IT" sz="2200" b="1" kern="1200" dirty="0"/>
+            <a:t> Router</a:t>
+          </a:r>
+          <a:endParaRPr lang="en-US" sz="2200" b="1" kern="1200" dirty="0"/>
+        </a:p>
+        <a:p>
+          <a:pPr marL="228600" lvl="1" indent="-228600" algn="l" defTabSz="977900">
+            <a:lnSpc>
+              <a:spcPct val="90000"/>
+            </a:lnSpc>
+            <a:spcBef>
+              <a:spcPct val="0"/>
+            </a:spcBef>
+            <a:spcAft>
+              <a:spcPct val="15000"/>
+            </a:spcAft>
+            <a:buFont typeface="Arial" panose="020B0604020202020204" pitchFamily="34" charset="0"/>
+            <a:buChar char="•"/>
+          </a:pPr>
+          <a:r>
             <a:rPr lang="it-IT" sz="2200" b="1" kern="1200" dirty="0" err="1"/>
             <a:t>RxJS</a:t>
           </a:r>
@@ -5943,8 +6310,8 @@
         </a:p>
       </dsp:txBody>
       <dsp:txXfrm>
-        <a:off x="0" y="52113"/>
-        <a:ext cx="7086599" cy="5980602"/>
+        <a:off x="0" y="0"/>
+        <a:ext cx="8382000" cy="6483266"/>
       </dsp:txXfrm>
     </dsp:sp>
     <dsp:sp modelId="{EF67F11A-FCD0-4E59-A23F-17BCC3FB1182}">
@@ -5954,8 +6321,8 @@
       </dsp:nvSpPr>
       <dsp:spPr>
         <a:xfrm>
-          <a:off x="532370" y="0"/>
-          <a:ext cx="4960619" cy="959503"/>
+          <a:off x="629685" y="0"/>
+          <a:ext cx="5867400" cy="997883"/>
         </a:xfrm>
         <a:prstGeom prst="roundRect">
           <a:avLst/>
@@ -6021,7 +6388,7 @@
         </a:fontRef>
       </dsp:style>
       <dsp:txBody>
-        <a:bodyPr spcFirstLastPara="0" vert="horz" wrap="square" lIns="187500" tIns="0" rIns="187500" bIns="0" numCol="1" spcCol="1270" anchor="ctr" anchorCtr="0">
+        <a:bodyPr spcFirstLastPara="0" vert="horz" wrap="square" lIns="221774" tIns="0" rIns="221774" bIns="0" numCol="1" spcCol="1270" anchor="ctr" anchorCtr="0">
           <a:noAutofit/>
         </a:bodyPr>
         <a:lstStyle/>
@@ -6054,8 +6421,8 @@
         </a:p>
       </dsp:txBody>
       <dsp:txXfrm>
-        <a:off x="579209" y="46839"/>
-        <a:ext cx="4866941" cy="865825"/>
+        <a:off x="678398" y="48713"/>
+        <a:ext cx="5769974" cy="900457"/>
       </dsp:txXfrm>
     </dsp:sp>
   </dsp:spTree>
@@ -12311,7 +12678,7 @@
           <a:p>
             <a:fld id="{7D0F7AA3-9057-4429-80B9-DC3D3FD0D30E}" type="datetimeFigureOut">
               <a:rPr lang="it-IT" smtClean="0"/>
-              <a:t>09/02/2026</a:t>
+              <a:t>12/02/2026</a:t>
             </a:fld>
             <a:endParaRPr lang="it-IT"/>
           </a:p>
@@ -12489,7 +12856,7 @@
           <a:p>
             <a:fld id="{DC233B30-4F8C-4A4C-AB5E-3B02323E36F5}" type="datetimeFigureOut">
               <a:rPr lang="it-IT" smtClean="0"/>
-              <a:t>09/02/2026</a:t>
+              <a:t>12/02/2026</a:t>
             </a:fld>
             <a:endParaRPr lang="it-IT"/>
           </a:p>
@@ -13027,7 +13394,7 @@
           <a:p>
             <a:fld id="{2AEBBCAD-870E-441A-8ABD-7498983D26CA}" type="datetime1">
               <a:rPr lang="en-US" smtClean="0"/>
-              <a:t>2/9/2026</a:t>
+              <a:t>2/12/2026</a:t>
             </a:fld>
             <a:endParaRPr lang="en-US"/>
           </a:p>
@@ -13191,7 +13558,7 @@
           <a:p>
             <a:fld id="{DBB619D4-11F3-4F3A-84A1-FD362988ED4B}" type="datetime1">
               <a:rPr lang="en-US" smtClean="0"/>
-              <a:t>2/9/2026</a:t>
+              <a:t>2/12/2026</a:t>
             </a:fld>
             <a:endParaRPr lang="en-US"/>
           </a:p>
@@ -13365,7 +13732,7 @@
           <a:p>
             <a:fld id="{9537A470-53D7-43F2-A38C-35EA5C3D9E3E}" type="datetime1">
               <a:rPr lang="en-US" smtClean="0"/>
-              <a:t>2/9/2026</a:t>
+              <a:t>2/12/2026</a:t>
             </a:fld>
             <a:endParaRPr lang="en-US"/>
           </a:p>
@@ -13529,7 +13896,7 @@
           <a:p>
             <a:fld id="{0CA91AF9-6521-45D8-81C8-C30E3165CD88}" type="datetime1">
               <a:rPr lang="en-US" smtClean="0"/>
-              <a:t>2/9/2026</a:t>
+              <a:t>2/12/2026</a:t>
             </a:fld>
             <a:endParaRPr lang="en-US"/>
           </a:p>
@@ -13770,7 +14137,7 @@
           <a:p>
             <a:fld id="{19ADD6C7-F40A-4EC5-A786-66FA25D032E8}" type="datetime1">
               <a:rPr lang="en-US" smtClean="0"/>
-              <a:t>2/9/2026</a:t>
+              <a:t>2/12/2026</a:t>
             </a:fld>
             <a:endParaRPr lang="en-US"/>
           </a:p>
@@ -14051,7 +14418,7 @@
           <a:p>
             <a:fld id="{73AF3211-BAC3-4D93-9598-8004ABF5F295}" type="datetime1">
               <a:rPr lang="en-US" smtClean="0"/>
-              <a:t>2/9/2026</a:t>
+              <a:t>2/12/2026</a:t>
             </a:fld>
             <a:endParaRPr lang="en-US"/>
           </a:p>
@@ -14466,7 +14833,7 @@
           <a:p>
             <a:fld id="{29EADF50-F9A2-4C97-A62A-50C60E010A22}" type="datetime1">
               <a:rPr lang="en-US" smtClean="0"/>
-              <a:t>2/9/2026</a:t>
+              <a:t>2/12/2026</a:t>
             </a:fld>
             <a:endParaRPr lang="en-US"/>
           </a:p>
@@ -14579,7 +14946,7 @@
           <a:p>
             <a:fld id="{DA927A00-663B-40A9-BEFA-F4F296EF78AF}" type="datetime1">
               <a:rPr lang="en-US" smtClean="0"/>
-              <a:t>2/9/2026</a:t>
+              <a:t>2/12/2026</a:t>
             </a:fld>
             <a:endParaRPr lang="en-US"/>
           </a:p>
@@ -14670,7 +15037,7 @@
           <a:p>
             <a:fld id="{130551C3-58EC-4AFE-B5E2-D1D9ADDB2862}" type="datetime1">
               <a:rPr lang="en-US" smtClean="0"/>
-              <a:t>2/9/2026</a:t>
+              <a:t>2/12/2026</a:t>
             </a:fld>
             <a:endParaRPr lang="en-US"/>
           </a:p>
@@ -14941,7 +15308,7 @@
           <a:p>
             <a:fld id="{C97796EB-1B2E-4E86-83B9-1E542E7481F4}" type="datetime1">
               <a:rPr lang="en-US" smtClean="0"/>
-              <a:t>2/9/2026</a:t>
+              <a:t>2/12/2026</a:t>
             </a:fld>
             <a:endParaRPr lang="en-US"/>
           </a:p>
@@ -15189,7 +15556,7 @@
           <a:p>
             <a:fld id="{F0DE7F15-0F43-40A0-8812-F3D41F61F70E}" type="datetime1">
               <a:rPr lang="en-US" smtClean="0"/>
-              <a:t>2/9/2026</a:t>
+              <a:t>2/12/2026</a:t>
             </a:fld>
             <a:endParaRPr lang="en-US"/>
           </a:p>
@@ -15396,7 +15763,7 @@
           <a:p>
             <a:fld id="{659F49B2-87B6-419A-8A54-1B4526018D64}" type="datetime1">
               <a:rPr lang="en-US" smtClean="0"/>
-              <a:t>2/9/2026</a:t>
+              <a:t>2/12/2026</a:t>
             </a:fld>
             <a:endParaRPr lang="en-US"/>
           </a:p>
@@ -16860,14 +17227,14 @@
           <p:nvPr>
             <p:extLst>
               <p:ext uri="{D42A27DB-BD31-4B8C-83A1-F6EECF244321}">
-                <p14:modId xmlns:p14="http://schemas.microsoft.com/office/powerpoint/2010/main" val="966120062"/>
+                <p14:modId xmlns:p14="http://schemas.microsoft.com/office/powerpoint/2010/main" val="3978282494"/>
               </p:ext>
             </p:extLst>
           </p:nvPr>
         </p:nvGraphicFramePr>
         <p:xfrm>
-          <a:off x="990600" y="3771900"/>
-          <a:ext cx="7086599" cy="6266835"/>
+          <a:off x="457200" y="3238500"/>
+          <a:ext cx="8382000" cy="6781800"/>
         </p:xfrm>
         <a:graphic>
           <a:graphicData uri="http://schemas.openxmlformats.org/drawingml/2006/diagram">
@@ -16902,7 +17269,7 @@
         </p:blipFill>
         <p:spPr>
           <a:xfrm>
-            <a:off x="8565643" y="6848361"/>
+            <a:off x="8839200" y="6972300"/>
             <a:ext cx="3200400" cy="3200400"/>
           </a:xfrm>
           <a:prstGeom prst="rect">

</xml_diff>